<commit_message>
Corrección PPT Presentacion 1
Se elimina Listado de Empresas con reservas, por no considerarse util y ser redundante
</commit_message>
<xml_diff>
--- a/Documentacion/Power Point Para 1 Presentacion/Sistema de Gestión hostal doña clarita 14 ppt.pptx
+++ b/Documentacion/Power Point Para 1 Presentacion/Sistema de Gestión hostal doña clarita 14 ppt.pptx
@@ -21,8 +21,7 @@
     <p:sldId id="267" r:id="rId15"/>
     <p:sldId id="268" r:id="rId16"/>
     <p:sldId id="271" r:id="rId17"/>
-    <p:sldId id="272" r:id="rId18"/>
-    <p:sldId id="274" r:id="rId19"/>
+    <p:sldId id="274" r:id="rId18"/>
   </p:sldIdLst>
   <p:sldSz cx="12192000" cy="6858000"/>
   <p:notesSz cx="6858000" cy="9144000"/>
@@ -190,7 +189,7 @@
           <a:noFill/>
           <a:extLst>
             <a:ext uri="{909E8E84-426E-40dd-AFC4-6F175D3DCCD1}">
-              <a14:hiddenFill xmlns:a14="http://schemas.microsoft.com/office/drawing/2010/main" xmlns="">
+              <a14:hiddenFill xmlns="" xmlns:a14="http://schemas.microsoft.com/office/drawing/2010/main">
                 <a:solidFill>
                   <a:srgbClr val="FFFFFF"/>
                 </a:solidFill>
@@ -249,7 +248,7 @@
             </a:ln>
             <a:extLst>
               <a:ext uri="{91240B29-F687-4f45-9708-019B960494DF}">
-                <a14:hiddenLine xmlns:a14="http://schemas.microsoft.com/office/drawing/2010/main" xmlns="" w="9525">
+                <a14:hiddenLine xmlns="" xmlns:a14="http://schemas.microsoft.com/office/drawing/2010/main" w="9525">
                   <a:solidFill>
                     <a:srgbClr val="000000"/>
                   </a:solidFill>
@@ -339,7 +338,7 @@
             </a:ln>
             <a:extLst>
               <a:ext uri="{91240B29-F687-4f45-9708-019B960494DF}">
-                <a14:hiddenLine xmlns:a14="http://schemas.microsoft.com/office/drawing/2010/main" xmlns="" w="9525">
+                <a14:hiddenLine xmlns="" xmlns:a14="http://schemas.microsoft.com/office/drawing/2010/main" w="9525">
                   <a:solidFill>
                     <a:srgbClr val="000000"/>
                   </a:solidFill>
@@ -429,7 +428,7 @@
             </a:ln>
             <a:extLst>
               <a:ext uri="{91240B29-F687-4f45-9708-019B960494DF}">
-                <a14:hiddenLine xmlns:a14="http://schemas.microsoft.com/office/drawing/2010/main" xmlns="" w="9525">
+                <a14:hiddenLine xmlns="" xmlns:a14="http://schemas.microsoft.com/office/drawing/2010/main" w="9525">
                   <a:solidFill>
                     <a:srgbClr val="000000"/>
                   </a:solidFill>
@@ -463,7 +462,7 @@
             </a:ln>
             <a:extLst>
               <a:ext uri="{91240B29-F687-4f45-9708-019B960494DF}">
-                <a14:hiddenLine xmlns:a14="http://schemas.microsoft.com/office/drawing/2010/main" xmlns="" w="9525">
+                <a14:hiddenLine xmlns="" xmlns:a14="http://schemas.microsoft.com/office/drawing/2010/main" w="9525">
                   <a:solidFill>
                     <a:srgbClr val="000000"/>
                   </a:solidFill>
@@ -553,7 +552,7 @@
             </a:ln>
             <a:extLst>
               <a:ext uri="{91240B29-F687-4f45-9708-019B960494DF}">
-                <a14:hiddenLine xmlns:a14="http://schemas.microsoft.com/office/drawing/2010/main" xmlns="" w="9525">
+                <a14:hiddenLine xmlns="" xmlns:a14="http://schemas.microsoft.com/office/drawing/2010/main" w="9525">
                   <a:solidFill>
                     <a:srgbClr val="000000"/>
                   </a:solidFill>
@@ -615,7 +614,7 @@
             </a:ln>
             <a:extLst>
               <a:ext uri="{91240B29-F687-4f45-9708-019B960494DF}">
-                <a14:hiddenLine xmlns:a14="http://schemas.microsoft.com/office/drawing/2010/main" xmlns="" w="9525">
+                <a14:hiddenLine xmlns="" xmlns:a14="http://schemas.microsoft.com/office/drawing/2010/main" w="9525">
                   <a:solidFill>
                     <a:srgbClr val="000000"/>
                   </a:solidFill>
@@ -677,7 +676,7 @@
             </a:ln>
             <a:extLst>
               <a:ext uri="{91240B29-F687-4f45-9708-019B960494DF}">
-                <a14:hiddenLine xmlns:a14="http://schemas.microsoft.com/office/drawing/2010/main" xmlns="" w="9525">
+                <a14:hiddenLine xmlns="" xmlns:a14="http://schemas.microsoft.com/office/drawing/2010/main" w="9525">
                   <a:solidFill>
                     <a:srgbClr val="000000"/>
                   </a:solidFill>
@@ -767,7 +766,7 @@
             </a:ln>
             <a:extLst>
               <a:ext uri="{91240B29-F687-4f45-9708-019B960494DF}">
-                <a14:hiddenLine xmlns:a14="http://schemas.microsoft.com/office/drawing/2010/main" xmlns="" w="9525">
+                <a14:hiddenLine xmlns="" xmlns:a14="http://schemas.microsoft.com/office/drawing/2010/main" w="9525">
                   <a:solidFill>
                     <a:srgbClr val="000000"/>
                   </a:solidFill>
@@ -829,7 +828,7 @@
             </a:ln>
             <a:extLst>
               <a:ext uri="{91240B29-F687-4f45-9708-019B960494DF}">
-                <a14:hiddenLine xmlns:a14="http://schemas.microsoft.com/office/drawing/2010/main" xmlns="" w="9525">
+                <a14:hiddenLine xmlns="" xmlns:a14="http://schemas.microsoft.com/office/drawing/2010/main" w="9525">
                   <a:solidFill>
                     <a:srgbClr val="000000"/>
                   </a:solidFill>
@@ -891,7 +890,7 @@
             </a:ln>
             <a:extLst>
               <a:ext uri="{91240B29-F687-4f45-9708-019B960494DF}">
-                <a14:hiddenLine xmlns:a14="http://schemas.microsoft.com/office/drawing/2010/main" xmlns="" w="9525">
+                <a14:hiddenLine xmlns="" xmlns:a14="http://schemas.microsoft.com/office/drawing/2010/main" w="9525">
                   <a:solidFill>
                     <a:srgbClr val="000000"/>
                   </a:solidFill>
@@ -981,7 +980,7 @@
             </a:ln>
             <a:extLst>
               <a:ext uri="{91240B29-F687-4f45-9708-019B960494DF}">
-                <a14:hiddenLine xmlns:a14="http://schemas.microsoft.com/office/drawing/2010/main" xmlns="" w="9525">
+                <a14:hiddenLine xmlns="" xmlns:a14="http://schemas.microsoft.com/office/drawing/2010/main" w="9525">
                   <a:solidFill>
                     <a:srgbClr val="000000"/>
                   </a:solidFill>
@@ -1071,7 +1070,7 @@
             </a:ln>
             <a:extLst>
               <a:ext uri="{91240B29-F687-4f45-9708-019B960494DF}">
-                <a14:hiddenLine xmlns:a14="http://schemas.microsoft.com/office/drawing/2010/main" xmlns="" w="9525">
+                <a14:hiddenLine xmlns="" xmlns:a14="http://schemas.microsoft.com/office/drawing/2010/main" w="9525">
                   <a:solidFill>
                     <a:srgbClr val="000000"/>
                   </a:solidFill>
@@ -1133,7 +1132,7 @@
             </a:ln>
             <a:extLst>
               <a:ext uri="{91240B29-F687-4f45-9708-019B960494DF}">
-                <a14:hiddenLine xmlns:a14="http://schemas.microsoft.com/office/drawing/2010/main" xmlns="" w="9525">
+                <a14:hiddenLine xmlns="" xmlns:a14="http://schemas.microsoft.com/office/drawing/2010/main" w="9525">
                   <a:solidFill>
                     <a:srgbClr val="000000"/>
                   </a:solidFill>
@@ -1243,7 +1242,7 @@
             </a:ln>
             <a:extLst>
               <a:ext uri="{91240B29-F687-4f45-9708-019B960494DF}">
-                <a14:hiddenLine xmlns:a14="http://schemas.microsoft.com/office/drawing/2010/main" xmlns="" w="9525">
+                <a14:hiddenLine xmlns="" xmlns:a14="http://schemas.microsoft.com/office/drawing/2010/main" w="9525">
                   <a:solidFill>
                     <a:srgbClr val="000000"/>
                   </a:solidFill>
@@ -1305,7 +1304,7 @@
             </a:ln>
             <a:extLst>
               <a:ext uri="{91240B29-F687-4f45-9708-019B960494DF}">
-                <a14:hiddenLine xmlns:a14="http://schemas.microsoft.com/office/drawing/2010/main" xmlns="" w="9525">
+                <a14:hiddenLine xmlns="" xmlns:a14="http://schemas.microsoft.com/office/drawing/2010/main" w="9525">
                   <a:solidFill>
                     <a:srgbClr val="000000"/>
                   </a:solidFill>
@@ -1395,7 +1394,7 @@
             </a:ln>
             <a:extLst>
               <a:ext uri="{91240B29-F687-4f45-9708-019B960494DF}">
-                <a14:hiddenLine xmlns:a14="http://schemas.microsoft.com/office/drawing/2010/main" xmlns="" w="9525">
+                <a14:hiddenLine xmlns="" xmlns:a14="http://schemas.microsoft.com/office/drawing/2010/main" w="9525">
                   <a:solidFill>
                     <a:srgbClr val="000000"/>
                   </a:solidFill>
@@ -1485,7 +1484,7 @@
             </a:ln>
             <a:extLst>
               <a:ext uri="{91240B29-F687-4f45-9708-019B960494DF}">
-                <a14:hiddenLine xmlns:a14="http://schemas.microsoft.com/office/drawing/2010/main" xmlns="" w="9525">
+                <a14:hiddenLine xmlns="" xmlns:a14="http://schemas.microsoft.com/office/drawing/2010/main" w="9525">
                   <a:solidFill>
                     <a:srgbClr val="000000"/>
                   </a:solidFill>
@@ -1547,7 +1546,7 @@
             </a:ln>
             <a:extLst>
               <a:ext uri="{91240B29-F687-4f45-9708-019B960494DF}">
-                <a14:hiddenLine xmlns:a14="http://schemas.microsoft.com/office/drawing/2010/main" xmlns="" w="9525">
+                <a14:hiddenLine xmlns="" xmlns:a14="http://schemas.microsoft.com/office/drawing/2010/main" w="9525">
                   <a:solidFill>
                     <a:srgbClr val="000000"/>
                   </a:solidFill>
@@ -1637,7 +1636,7 @@
             </a:ln>
             <a:extLst>
               <a:ext uri="{91240B29-F687-4f45-9708-019B960494DF}">
-                <a14:hiddenLine xmlns:a14="http://schemas.microsoft.com/office/drawing/2010/main" xmlns="" w="9525">
+                <a14:hiddenLine xmlns="" xmlns:a14="http://schemas.microsoft.com/office/drawing/2010/main" w="9525">
                   <a:solidFill>
                     <a:srgbClr val="000000"/>
                   </a:solidFill>
@@ -1727,7 +1726,7 @@
             </a:ln>
             <a:extLst>
               <a:ext uri="{91240B29-F687-4f45-9708-019B960494DF}">
-                <a14:hiddenLine xmlns:a14="http://schemas.microsoft.com/office/drawing/2010/main" xmlns="" w="9525">
+                <a14:hiddenLine xmlns="" xmlns:a14="http://schemas.microsoft.com/office/drawing/2010/main" w="9525">
                   <a:solidFill>
                     <a:srgbClr val="000000"/>
                   </a:solidFill>
@@ -1783,7 +1782,7 @@
             </a:ln>
             <a:extLst>
               <a:ext uri="{91240B29-F687-4f45-9708-019B960494DF}">
-                <a14:hiddenLine xmlns:a14="http://schemas.microsoft.com/office/drawing/2010/main" xmlns="" w="9525">
+                <a14:hiddenLine xmlns="" xmlns:a14="http://schemas.microsoft.com/office/drawing/2010/main" w="9525">
                   <a:solidFill>
                     <a:srgbClr val="000000"/>
                   </a:solidFill>
@@ -1873,7 +1872,7 @@
             </a:ln>
             <a:extLst>
               <a:ext uri="{91240B29-F687-4f45-9708-019B960494DF}">
-                <a14:hiddenLine xmlns:a14="http://schemas.microsoft.com/office/drawing/2010/main" xmlns="" w="9525">
+                <a14:hiddenLine xmlns="" xmlns:a14="http://schemas.microsoft.com/office/drawing/2010/main" w="9525">
                   <a:solidFill>
                     <a:srgbClr val="000000"/>
                   </a:solidFill>
@@ -1929,7 +1928,7 @@
             </a:ln>
             <a:extLst>
               <a:ext uri="{91240B29-F687-4f45-9708-019B960494DF}">
-                <a14:hiddenLine xmlns:a14="http://schemas.microsoft.com/office/drawing/2010/main" xmlns="" w="9525">
+                <a14:hiddenLine xmlns="" xmlns:a14="http://schemas.microsoft.com/office/drawing/2010/main" w="9525">
                   <a:solidFill>
                     <a:srgbClr val="000000"/>
                   </a:solidFill>
@@ -2019,7 +2018,7 @@
             </a:ln>
             <a:extLst>
               <a:ext uri="{91240B29-F687-4f45-9708-019B960494DF}">
-                <a14:hiddenLine xmlns:a14="http://schemas.microsoft.com/office/drawing/2010/main" xmlns="" w="9525">
+                <a14:hiddenLine xmlns="" xmlns:a14="http://schemas.microsoft.com/office/drawing/2010/main" w="9525">
                   <a:solidFill>
                     <a:srgbClr val="000000"/>
                   </a:solidFill>
@@ -2087,7 +2086,7 @@
             </a:ln>
             <a:extLst>
               <a:ext uri="{91240B29-F687-4f45-9708-019B960494DF}">
-                <a14:hiddenLine xmlns:a14="http://schemas.microsoft.com/office/drawing/2010/main" xmlns="" w="9525">
+                <a14:hiddenLine xmlns="" xmlns:a14="http://schemas.microsoft.com/office/drawing/2010/main" w="9525">
                   <a:solidFill>
                     <a:srgbClr val="000000"/>
                   </a:solidFill>
@@ -2177,7 +2176,7 @@
             </a:ln>
             <a:extLst>
               <a:ext uri="{91240B29-F687-4f45-9708-019B960494DF}">
-                <a14:hiddenLine xmlns:a14="http://schemas.microsoft.com/office/drawing/2010/main" xmlns="" w="9525">
+                <a14:hiddenLine xmlns="" xmlns:a14="http://schemas.microsoft.com/office/drawing/2010/main" w="9525">
                   <a:solidFill>
                     <a:srgbClr val="000000"/>
                   </a:solidFill>
@@ -2245,7 +2244,7 @@
             </a:ln>
             <a:extLst>
               <a:ext uri="{91240B29-F687-4f45-9708-019B960494DF}">
-                <a14:hiddenLine xmlns:a14="http://schemas.microsoft.com/office/drawing/2010/main" xmlns="" w="9525">
+                <a14:hiddenLine xmlns="" xmlns:a14="http://schemas.microsoft.com/office/drawing/2010/main" w="9525">
                   <a:solidFill>
                     <a:srgbClr val="000000"/>
                   </a:solidFill>
@@ -2335,7 +2334,7 @@
             </a:ln>
             <a:extLst>
               <a:ext uri="{91240B29-F687-4f45-9708-019B960494DF}">
-                <a14:hiddenLine xmlns:a14="http://schemas.microsoft.com/office/drawing/2010/main" xmlns="" w="9525">
+                <a14:hiddenLine xmlns="" xmlns:a14="http://schemas.microsoft.com/office/drawing/2010/main" w="9525">
                   <a:solidFill>
                     <a:srgbClr val="000000"/>
                   </a:solidFill>
@@ -2369,7 +2368,7 @@
             </a:ln>
             <a:extLst>
               <a:ext uri="{91240B29-F687-4f45-9708-019B960494DF}">
-                <a14:hiddenLine xmlns:a14="http://schemas.microsoft.com/office/drawing/2010/main" xmlns="" w="9525">
+                <a14:hiddenLine xmlns="" xmlns:a14="http://schemas.microsoft.com/office/drawing/2010/main" w="9525">
                   <a:solidFill>
                     <a:srgbClr val="000000"/>
                   </a:solidFill>
@@ -2459,7 +2458,7 @@
             </a:ln>
             <a:extLst>
               <a:ext uri="{91240B29-F687-4f45-9708-019B960494DF}">
-                <a14:hiddenLine xmlns:a14="http://schemas.microsoft.com/office/drawing/2010/main" xmlns="" w="9525">
+                <a14:hiddenLine xmlns="" xmlns:a14="http://schemas.microsoft.com/office/drawing/2010/main" w="9525">
                   <a:solidFill>
                     <a:srgbClr val="000000"/>
                   </a:solidFill>
@@ -2521,7 +2520,7 @@
             </a:ln>
             <a:extLst>
               <a:ext uri="{91240B29-F687-4f45-9708-019B960494DF}">
-                <a14:hiddenLine xmlns:a14="http://schemas.microsoft.com/office/drawing/2010/main" xmlns="" w="9525">
+                <a14:hiddenLine xmlns="" xmlns:a14="http://schemas.microsoft.com/office/drawing/2010/main" w="9525">
                   <a:solidFill>
                     <a:srgbClr val="000000"/>
                   </a:solidFill>
@@ -2583,7 +2582,7 @@
             </a:ln>
             <a:extLst>
               <a:ext uri="{91240B29-F687-4f45-9708-019B960494DF}">
-                <a14:hiddenLine xmlns:a14="http://schemas.microsoft.com/office/drawing/2010/main" xmlns="" w="9525">
+                <a14:hiddenLine xmlns="" xmlns:a14="http://schemas.microsoft.com/office/drawing/2010/main" w="9525">
                   <a:solidFill>
                     <a:srgbClr val="000000"/>
                   </a:solidFill>
@@ -2673,7 +2672,7 @@
             </a:ln>
             <a:extLst>
               <a:ext uri="{91240B29-F687-4f45-9708-019B960494DF}">
-                <a14:hiddenLine xmlns:a14="http://schemas.microsoft.com/office/drawing/2010/main" xmlns="" w="9525">
+                <a14:hiddenLine xmlns="" xmlns:a14="http://schemas.microsoft.com/office/drawing/2010/main" w="9525">
                   <a:solidFill>
                     <a:srgbClr val="000000"/>
                   </a:solidFill>
@@ -2741,7 +2740,7 @@
             </a:ln>
             <a:extLst>
               <a:ext uri="{91240B29-F687-4f45-9708-019B960494DF}">
-                <a14:hiddenLine xmlns:a14="http://schemas.microsoft.com/office/drawing/2010/main" xmlns="" w="9525">
+                <a14:hiddenLine xmlns="" xmlns:a14="http://schemas.microsoft.com/office/drawing/2010/main" w="9525">
                   <a:solidFill>
                     <a:srgbClr val="000000"/>
                   </a:solidFill>
@@ -2803,7 +2802,7 @@
             </a:ln>
             <a:extLst>
               <a:ext uri="{91240B29-F687-4f45-9708-019B960494DF}">
-                <a14:hiddenLine xmlns:a14="http://schemas.microsoft.com/office/drawing/2010/main" xmlns="" w="9525">
+                <a14:hiddenLine xmlns="" xmlns:a14="http://schemas.microsoft.com/office/drawing/2010/main" w="9525">
                   <a:solidFill>
                     <a:srgbClr val="000000"/>
                   </a:solidFill>
@@ -2893,7 +2892,7 @@
             </a:ln>
             <a:extLst>
               <a:ext uri="{91240B29-F687-4f45-9708-019B960494DF}">
-                <a14:hiddenLine xmlns:a14="http://schemas.microsoft.com/office/drawing/2010/main" xmlns="" w="9525">
+                <a14:hiddenLine xmlns="" xmlns:a14="http://schemas.microsoft.com/office/drawing/2010/main" w="9525">
                   <a:solidFill>
                     <a:srgbClr val="000000"/>
                   </a:solidFill>
@@ -2955,7 +2954,7 @@
             </a:ln>
             <a:extLst>
               <a:ext uri="{91240B29-F687-4f45-9708-019B960494DF}">
-                <a14:hiddenLine xmlns:a14="http://schemas.microsoft.com/office/drawing/2010/main" xmlns="" w="9525">
+                <a14:hiddenLine xmlns="" xmlns:a14="http://schemas.microsoft.com/office/drawing/2010/main" w="9525">
                   <a:solidFill>
                     <a:srgbClr val="000000"/>
                   </a:solidFill>
@@ -3045,7 +3044,7 @@
             </a:ln>
             <a:extLst>
               <a:ext uri="{91240B29-F687-4f45-9708-019B960494DF}">
-                <a14:hiddenLine xmlns:a14="http://schemas.microsoft.com/office/drawing/2010/main" xmlns="" w="9525">
+                <a14:hiddenLine xmlns="" xmlns:a14="http://schemas.microsoft.com/office/drawing/2010/main" w="9525">
                   <a:solidFill>
                     <a:srgbClr val="000000"/>
                   </a:solidFill>
@@ -3107,7 +3106,7 @@
             </a:ln>
             <a:extLst>
               <a:ext uri="{91240B29-F687-4f45-9708-019B960494DF}">
-                <a14:hiddenLine xmlns:a14="http://schemas.microsoft.com/office/drawing/2010/main" xmlns="" w="9525">
+                <a14:hiddenLine xmlns="" xmlns:a14="http://schemas.microsoft.com/office/drawing/2010/main" w="9525">
                   <a:solidFill>
                     <a:srgbClr val="000000"/>
                   </a:solidFill>
@@ -3197,7 +3196,7 @@
             </a:ln>
             <a:extLst>
               <a:ext uri="{91240B29-F687-4f45-9708-019B960494DF}">
-                <a14:hiddenLine xmlns:a14="http://schemas.microsoft.com/office/drawing/2010/main" xmlns="" w="9525">
+                <a14:hiddenLine xmlns="" xmlns:a14="http://schemas.microsoft.com/office/drawing/2010/main" w="9525">
                   <a:solidFill>
                     <a:srgbClr val="000000"/>
                   </a:solidFill>
@@ -3231,7 +3230,7 @@
             </a:ln>
             <a:extLst>
               <a:ext uri="{91240B29-F687-4f45-9708-019B960494DF}">
-                <a14:hiddenLine xmlns:a14="http://schemas.microsoft.com/office/drawing/2010/main" xmlns="" w="9525">
+                <a14:hiddenLine xmlns="" xmlns:a14="http://schemas.microsoft.com/office/drawing/2010/main" w="9525">
                   <a:solidFill>
                     <a:srgbClr val="000000"/>
                   </a:solidFill>
@@ -3296,7 +3295,7 @@
             </a:ln>
             <a:extLst>
               <a:ext uri="{91240B29-F687-4f45-9708-019B960494DF}">
-                <a14:hiddenLine xmlns:a14="http://schemas.microsoft.com/office/drawing/2010/main" xmlns="" w="9525">
+                <a14:hiddenLine xmlns="" xmlns:a14="http://schemas.microsoft.com/office/drawing/2010/main" w="9525">
                   <a:solidFill>
                     <a:srgbClr val="000000"/>
                   </a:solidFill>
@@ -3386,7 +3385,7 @@
             </a:ln>
             <a:extLst>
               <a:ext uri="{91240B29-F687-4f45-9708-019B960494DF}">
-                <a14:hiddenLine xmlns:a14="http://schemas.microsoft.com/office/drawing/2010/main" xmlns="" w="9525">
+                <a14:hiddenLine xmlns="" xmlns:a14="http://schemas.microsoft.com/office/drawing/2010/main" w="9525">
                   <a:solidFill>
                     <a:srgbClr val="000000"/>
                   </a:solidFill>
@@ -3448,7 +3447,7 @@
             </a:ln>
             <a:extLst>
               <a:ext uri="{91240B29-F687-4f45-9708-019B960494DF}">
-                <a14:hiddenLine xmlns:a14="http://schemas.microsoft.com/office/drawing/2010/main" xmlns="" w="9525">
+                <a14:hiddenLine xmlns="" xmlns:a14="http://schemas.microsoft.com/office/drawing/2010/main" w="9525">
                   <a:solidFill>
                     <a:srgbClr val="000000"/>
                   </a:solidFill>
@@ -3538,7 +3537,7 @@
             </a:ln>
             <a:extLst>
               <a:ext uri="{91240B29-F687-4f45-9708-019B960494DF}">
-                <a14:hiddenLine xmlns:a14="http://schemas.microsoft.com/office/drawing/2010/main" xmlns="" w="9525">
+                <a14:hiddenLine xmlns="" xmlns:a14="http://schemas.microsoft.com/office/drawing/2010/main" w="9525">
                   <a:solidFill>
                     <a:srgbClr val="000000"/>
                   </a:solidFill>
@@ -3628,7 +3627,7 @@
             </a:ln>
             <a:extLst>
               <a:ext uri="{91240B29-F687-4f45-9708-019B960494DF}">
-                <a14:hiddenLine xmlns:a14="http://schemas.microsoft.com/office/drawing/2010/main" xmlns="" w="9525">
+                <a14:hiddenLine xmlns="" xmlns:a14="http://schemas.microsoft.com/office/drawing/2010/main" w="9525">
                   <a:solidFill>
                     <a:srgbClr val="000000"/>
                   </a:solidFill>
@@ -3693,7 +3692,7 @@
             </a:ln>
             <a:extLst>
               <a:ext uri="{91240B29-F687-4f45-9708-019B960494DF}">
-                <a14:hiddenLine xmlns:a14="http://schemas.microsoft.com/office/drawing/2010/main" xmlns="" w="9525">
+                <a14:hiddenLine xmlns="" xmlns:a14="http://schemas.microsoft.com/office/drawing/2010/main" w="9525">
                   <a:solidFill>
                     <a:srgbClr val="000000"/>
                   </a:solidFill>
@@ -3755,7 +3754,7 @@
             </a:ln>
             <a:extLst>
               <a:ext uri="{91240B29-F687-4f45-9708-019B960494DF}">
-                <a14:hiddenLine xmlns:a14="http://schemas.microsoft.com/office/drawing/2010/main" xmlns="" w="9525">
+                <a14:hiddenLine xmlns="" xmlns:a14="http://schemas.microsoft.com/office/drawing/2010/main" w="9525">
                   <a:solidFill>
                     <a:srgbClr val="000000"/>
                   </a:solidFill>
@@ -3845,7 +3844,7 @@
             </a:ln>
             <a:extLst>
               <a:ext uri="{91240B29-F687-4f45-9708-019B960494DF}">
-                <a14:hiddenLine xmlns:a14="http://schemas.microsoft.com/office/drawing/2010/main" xmlns="" w="9525">
+                <a14:hiddenLine xmlns="" xmlns:a14="http://schemas.microsoft.com/office/drawing/2010/main" w="9525">
                   <a:solidFill>
                     <a:srgbClr val="000000"/>
                   </a:solidFill>
@@ -3935,7 +3934,7 @@
             </a:ln>
             <a:extLst>
               <a:ext uri="{91240B29-F687-4f45-9708-019B960494DF}">
-                <a14:hiddenLine xmlns:a14="http://schemas.microsoft.com/office/drawing/2010/main" xmlns="" w="9525">
+                <a14:hiddenLine xmlns="" xmlns:a14="http://schemas.microsoft.com/office/drawing/2010/main" w="9525">
                   <a:solidFill>
                     <a:srgbClr val="000000"/>
                   </a:solidFill>
@@ -3997,7 +3996,7 @@
             </a:ln>
             <a:extLst>
               <a:ext uri="{91240B29-F687-4f45-9708-019B960494DF}">
-                <a14:hiddenLine xmlns:a14="http://schemas.microsoft.com/office/drawing/2010/main" xmlns="" w="9525">
+                <a14:hiddenLine xmlns="" xmlns:a14="http://schemas.microsoft.com/office/drawing/2010/main" w="9525">
                   <a:solidFill>
                     <a:srgbClr val="000000"/>
                   </a:solidFill>
@@ -4117,7 +4116,7 @@
             </a:ln>
             <a:extLst>
               <a:ext uri="{91240B29-F687-4f45-9708-019B960494DF}">
-                <a14:hiddenLine xmlns:a14="http://schemas.microsoft.com/office/drawing/2010/main" xmlns="" w="9525">
+                <a14:hiddenLine xmlns="" xmlns:a14="http://schemas.microsoft.com/office/drawing/2010/main" w="9525">
                   <a:solidFill>
                     <a:srgbClr val="000000"/>
                   </a:solidFill>
@@ -4185,7 +4184,7 @@
             </a:ln>
             <a:extLst>
               <a:ext uri="{91240B29-F687-4f45-9708-019B960494DF}">
-                <a14:hiddenLine xmlns:a14="http://schemas.microsoft.com/office/drawing/2010/main" xmlns="" w="9525">
+                <a14:hiddenLine xmlns="" xmlns:a14="http://schemas.microsoft.com/office/drawing/2010/main" w="9525">
                   <a:solidFill>
                     <a:srgbClr val="000000"/>
                   </a:solidFill>
@@ -4275,7 +4274,7 @@
             </a:ln>
             <a:extLst>
               <a:ext uri="{91240B29-F687-4f45-9708-019B960494DF}">
-                <a14:hiddenLine xmlns:a14="http://schemas.microsoft.com/office/drawing/2010/main" xmlns="" w="9525">
+                <a14:hiddenLine xmlns="" xmlns:a14="http://schemas.microsoft.com/office/drawing/2010/main" w="9525">
                   <a:solidFill>
                     <a:srgbClr val="000000"/>
                   </a:solidFill>
@@ -9004,7 +9003,7 @@
           <a:noFill/>
           <a:extLst>
             <a:ext uri="{909E8E84-426E-40dd-AFC4-6F175D3DCCD1}">
-              <a14:hiddenFill xmlns:a14="http://schemas.microsoft.com/office/drawing/2010/main" xmlns="">
+              <a14:hiddenFill xmlns="" xmlns:a14="http://schemas.microsoft.com/office/drawing/2010/main">
                 <a:solidFill>
                   <a:srgbClr val="FFFFFF"/>
                 </a:solidFill>
@@ -9078,7 +9077,7 @@
               </a:ln>
               <a:extLst>
                 <a:ext uri="{91240B29-F687-4f45-9708-019B960494DF}">
-                  <a14:hiddenLine xmlns:a14="http://schemas.microsoft.com/office/drawing/2010/main" xmlns="" w="9525">
+                  <a14:hiddenLine xmlns="" xmlns:a14="http://schemas.microsoft.com/office/drawing/2010/main" w="9525">
                     <a:solidFill>
                       <a:srgbClr val="000000"/>
                     </a:solidFill>
@@ -9168,7 +9167,7 @@
               </a:ln>
               <a:extLst>
                 <a:ext uri="{91240B29-F687-4f45-9708-019B960494DF}">
-                  <a14:hiddenLine xmlns:a14="http://schemas.microsoft.com/office/drawing/2010/main" xmlns="" w="9525">
+                  <a14:hiddenLine xmlns="" xmlns:a14="http://schemas.microsoft.com/office/drawing/2010/main" w="9525">
                     <a:solidFill>
                       <a:srgbClr val="000000"/>
                     </a:solidFill>
@@ -9258,7 +9257,7 @@
               </a:ln>
               <a:extLst>
                 <a:ext uri="{91240B29-F687-4f45-9708-019B960494DF}">
-                  <a14:hiddenLine xmlns:a14="http://schemas.microsoft.com/office/drawing/2010/main" xmlns="" w="9525">
+                  <a14:hiddenLine xmlns="" xmlns:a14="http://schemas.microsoft.com/office/drawing/2010/main" w="9525">
                     <a:solidFill>
                       <a:srgbClr val="000000"/>
                     </a:solidFill>
@@ -9320,7 +9319,7 @@
               </a:ln>
               <a:extLst>
                 <a:ext uri="{91240B29-F687-4f45-9708-019B960494DF}">
-                  <a14:hiddenLine xmlns:a14="http://schemas.microsoft.com/office/drawing/2010/main" xmlns="" w="9525">
+                  <a14:hiddenLine xmlns="" xmlns:a14="http://schemas.microsoft.com/office/drawing/2010/main" w="9525">
                     <a:solidFill>
                       <a:srgbClr val="000000"/>
                     </a:solidFill>
@@ -9410,7 +9409,7 @@
               </a:ln>
               <a:extLst>
                 <a:ext uri="{91240B29-F687-4f45-9708-019B960494DF}">
-                  <a14:hiddenLine xmlns:a14="http://schemas.microsoft.com/office/drawing/2010/main" xmlns="" w="9525">
+                  <a14:hiddenLine xmlns="" xmlns:a14="http://schemas.microsoft.com/office/drawing/2010/main" w="9525">
                     <a:solidFill>
                       <a:srgbClr val="000000"/>
                     </a:solidFill>
@@ -9472,7 +9471,7 @@
               </a:ln>
               <a:extLst>
                 <a:ext uri="{91240B29-F687-4f45-9708-019B960494DF}">
-                  <a14:hiddenLine xmlns:a14="http://schemas.microsoft.com/office/drawing/2010/main" xmlns="" w="9525">
+                  <a14:hiddenLine xmlns="" xmlns:a14="http://schemas.microsoft.com/office/drawing/2010/main" w="9525">
                     <a:solidFill>
                       <a:srgbClr val="000000"/>
                     </a:solidFill>
@@ -9534,7 +9533,7 @@
               </a:ln>
               <a:extLst>
                 <a:ext uri="{91240B29-F687-4f45-9708-019B960494DF}">
-                  <a14:hiddenLine xmlns:a14="http://schemas.microsoft.com/office/drawing/2010/main" xmlns="" w="9525">
+                  <a14:hiddenLine xmlns="" xmlns:a14="http://schemas.microsoft.com/office/drawing/2010/main" w="9525">
                     <a:solidFill>
                       <a:srgbClr val="000000"/>
                     </a:solidFill>
@@ -9624,7 +9623,7 @@
               </a:ln>
               <a:extLst>
                 <a:ext uri="{91240B29-F687-4f45-9708-019B960494DF}">
-                  <a14:hiddenLine xmlns:a14="http://schemas.microsoft.com/office/drawing/2010/main" xmlns="" w="9525">
+                  <a14:hiddenLine xmlns="" xmlns:a14="http://schemas.microsoft.com/office/drawing/2010/main" w="9525">
                     <a:solidFill>
                       <a:srgbClr val="000000"/>
                     </a:solidFill>
@@ -9714,7 +9713,7 @@
               </a:ln>
               <a:extLst>
                 <a:ext uri="{91240B29-F687-4f45-9708-019B960494DF}">
-                  <a14:hiddenLine xmlns:a14="http://schemas.microsoft.com/office/drawing/2010/main" xmlns="" w="9525">
+                  <a14:hiddenLine xmlns="" xmlns:a14="http://schemas.microsoft.com/office/drawing/2010/main" w="9525">
                     <a:solidFill>
                       <a:srgbClr val="000000"/>
                     </a:solidFill>
@@ -9776,7 +9775,7 @@
               </a:ln>
               <a:extLst>
                 <a:ext uri="{91240B29-F687-4f45-9708-019B960494DF}">
-                  <a14:hiddenLine xmlns:a14="http://schemas.microsoft.com/office/drawing/2010/main" xmlns="" w="9525">
+                  <a14:hiddenLine xmlns="" xmlns:a14="http://schemas.microsoft.com/office/drawing/2010/main" w="9525">
                     <a:solidFill>
                       <a:srgbClr val="000000"/>
                     </a:solidFill>
@@ -9886,7 +9885,7 @@
               </a:ln>
               <a:extLst>
                 <a:ext uri="{91240B29-F687-4f45-9708-019B960494DF}">
-                  <a14:hiddenLine xmlns:a14="http://schemas.microsoft.com/office/drawing/2010/main" xmlns="" w="9525">
+                  <a14:hiddenLine xmlns="" xmlns:a14="http://schemas.microsoft.com/office/drawing/2010/main" w="9525">
                     <a:solidFill>
                       <a:srgbClr val="000000"/>
                     </a:solidFill>
@@ -9970,7 +9969,7 @@
               </a:ln>
               <a:extLst>
                 <a:ext uri="{91240B29-F687-4f45-9708-019B960494DF}">
-                  <a14:hiddenLine xmlns:a14="http://schemas.microsoft.com/office/drawing/2010/main" xmlns="" w="9525">
+                  <a14:hiddenLine xmlns="" xmlns:a14="http://schemas.microsoft.com/office/drawing/2010/main" w="9525">
                     <a:solidFill>
                       <a:srgbClr val="000000"/>
                     </a:solidFill>
@@ -10032,7 +10031,7 @@
               </a:ln>
               <a:extLst>
                 <a:ext uri="{91240B29-F687-4f45-9708-019B960494DF}">
-                  <a14:hiddenLine xmlns:a14="http://schemas.microsoft.com/office/drawing/2010/main" xmlns="" w="9525">
+                  <a14:hiddenLine xmlns="" xmlns:a14="http://schemas.microsoft.com/office/drawing/2010/main" w="9525">
                     <a:solidFill>
                       <a:srgbClr val="000000"/>
                     </a:solidFill>
@@ -10094,7 +10093,7 @@
               </a:ln>
               <a:extLst>
                 <a:ext uri="{91240B29-F687-4f45-9708-019B960494DF}">
-                  <a14:hiddenLine xmlns:a14="http://schemas.microsoft.com/office/drawing/2010/main" xmlns="" w="9525">
+                  <a14:hiddenLine xmlns="" xmlns:a14="http://schemas.microsoft.com/office/drawing/2010/main" w="9525">
                     <a:solidFill>
                       <a:srgbClr val="000000"/>
                     </a:solidFill>
@@ -10184,7 +10183,7 @@
               </a:ln>
               <a:extLst>
                 <a:ext uri="{91240B29-F687-4f45-9708-019B960494DF}">
-                  <a14:hiddenLine xmlns:a14="http://schemas.microsoft.com/office/drawing/2010/main" xmlns="" w="9525">
+                  <a14:hiddenLine xmlns="" xmlns:a14="http://schemas.microsoft.com/office/drawing/2010/main" w="9525">
                     <a:solidFill>
                       <a:srgbClr val="000000"/>
                     </a:solidFill>
@@ -10218,7 +10217,7 @@
               </a:ln>
               <a:extLst>
                 <a:ext uri="{91240B29-F687-4f45-9708-019B960494DF}">
-                  <a14:hiddenLine xmlns:a14="http://schemas.microsoft.com/office/drawing/2010/main" xmlns="" w="9525">
+                  <a14:hiddenLine xmlns="" xmlns:a14="http://schemas.microsoft.com/office/drawing/2010/main" w="9525">
                     <a:solidFill>
                       <a:srgbClr val="000000"/>
                     </a:solidFill>
@@ -10283,7 +10282,7 @@
               </a:ln>
               <a:extLst>
                 <a:ext uri="{91240B29-F687-4f45-9708-019B960494DF}">
-                  <a14:hiddenLine xmlns:a14="http://schemas.microsoft.com/office/drawing/2010/main" xmlns="" w="9525">
+                  <a14:hiddenLine xmlns="" xmlns:a14="http://schemas.microsoft.com/office/drawing/2010/main" w="9525">
                     <a:solidFill>
                       <a:srgbClr val="000000"/>
                     </a:solidFill>
@@ -10373,7 +10372,7 @@
               </a:ln>
               <a:extLst>
                 <a:ext uri="{91240B29-F687-4f45-9708-019B960494DF}">
-                  <a14:hiddenLine xmlns:a14="http://schemas.microsoft.com/office/drawing/2010/main" xmlns="" w="9525">
+                  <a14:hiddenLine xmlns="" xmlns:a14="http://schemas.microsoft.com/office/drawing/2010/main" w="9525">
                     <a:solidFill>
                       <a:srgbClr val="000000"/>
                     </a:solidFill>
@@ -10435,7 +10434,7 @@
               </a:ln>
               <a:extLst>
                 <a:ext uri="{91240B29-F687-4f45-9708-019B960494DF}">
-                  <a14:hiddenLine xmlns:a14="http://schemas.microsoft.com/office/drawing/2010/main" xmlns="" w="9525">
+                  <a14:hiddenLine xmlns="" xmlns:a14="http://schemas.microsoft.com/office/drawing/2010/main" w="9525">
                     <a:solidFill>
                       <a:srgbClr val="000000"/>
                     </a:solidFill>
@@ -10525,7 +10524,7 @@
               </a:ln>
               <a:extLst>
                 <a:ext uri="{91240B29-F687-4f45-9708-019B960494DF}">
-                  <a14:hiddenLine xmlns:a14="http://schemas.microsoft.com/office/drawing/2010/main" xmlns="" w="9525">
+                  <a14:hiddenLine xmlns="" xmlns:a14="http://schemas.microsoft.com/office/drawing/2010/main" w="9525">
                     <a:solidFill>
                       <a:srgbClr val="000000"/>
                     </a:solidFill>
@@ -10590,7 +10589,7 @@
               </a:ln>
               <a:extLst>
                 <a:ext uri="{91240B29-F687-4f45-9708-019B960494DF}">
-                  <a14:hiddenLine xmlns:a14="http://schemas.microsoft.com/office/drawing/2010/main" xmlns="" w="9525">
+                  <a14:hiddenLine xmlns="" xmlns:a14="http://schemas.microsoft.com/office/drawing/2010/main" w="9525">
                     <a:solidFill>
                       <a:srgbClr val="000000"/>
                     </a:solidFill>
@@ -10652,7 +10651,7 @@
               </a:ln>
               <a:extLst>
                 <a:ext uri="{91240B29-F687-4f45-9708-019B960494DF}">
-                  <a14:hiddenLine xmlns:a14="http://schemas.microsoft.com/office/drawing/2010/main" xmlns="" w="9525">
+                  <a14:hiddenLine xmlns="" xmlns:a14="http://schemas.microsoft.com/office/drawing/2010/main" w="9525">
                     <a:solidFill>
                       <a:srgbClr val="000000"/>
                     </a:solidFill>
@@ -10742,7 +10741,7 @@
               </a:ln>
               <a:extLst>
                 <a:ext uri="{91240B29-F687-4f45-9708-019B960494DF}">
-                  <a14:hiddenLine xmlns:a14="http://schemas.microsoft.com/office/drawing/2010/main" xmlns="" w="9525">
+                  <a14:hiddenLine xmlns="" xmlns:a14="http://schemas.microsoft.com/office/drawing/2010/main" w="9525">
                     <a:solidFill>
                       <a:srgbClr val="000000"/>
                     </a:solidFill>
@@ -10832,7 +10831,7 @@
               </a:ln>
               <a:extLst>
                 <a:ext uri="{91240B29-F687-4f45-9708-019B960494DF}">
-                  <a14:hiddenLine xmlns:a14="http://schemas.microsoft.com/office/drawing/2010/main" xmlns="" w="9525">
+                  <a14:hiddenLine xmlns="" xmlns:a14="http://schemas.microsoft.com/office/drawing/2010/main" w="9525">
                     <a:solidFill>
                       <a:srgbClr val="000000"/>
                     </a:solidFill>
@@ -10897,7 +10896,7 @@
               </a:ln>
               <a:extLst>
                 <a:ext uri="{91240B29-F687-4f45-9708-019B960494DF}">
-                  <a14:hiddenLine xmlns:a14="http://schemas.microsoft.com/office/drawing/2010/main" xmlns="" w="9525">
+                  <a14:hiddenLine xmlns="" xmlns:a14="http://schemas.microsoft.com/office/drawing/2010/main" w="9525">
                     <a:solidFill>
                       <a:srgbClr val="000000"/>
                     </a:solidFill>
@@ -11017,7 +11016,7 @@
               </a:ln>
               <a:extLst>
                 <a:ext uri="{91240B29-F687-4f45-9708-019B960494DF}">
-                  <a14:hiddenLine xmlns:a14="http://schemas.microsoft.com/office/drawing/2010/main" xmlns="" w="9525">
+                  <a14:hiddenLine xmlns="" xmlns:a14="http://schemas.microsoft.com/office/drawing/2010/main" w="9525">
                     <a:solidFill>
                       <a:srgbClr val="000000"/>
                     </a:solidFill>
@@ -11098,7 +11097,7 @@
               </a:ln>
               <a:extLst>
                 <a:ext uri="{91240B29-F687-4f45-9708-019B960494DF}">
-                  <a14:hiddenLine xmlns:a14="http://schemas.microsoft.com/office/drawing/2010/main" xmlns="" w="9525">
+                  <a14:hiddenLine xmlns="" xmlns:a14="http://schemas.microsoft.com/office/drawing/2010/main" w="9525">
                     <a:solidFill>
                       <a:srgbClr val="000000"/>
                     </a:solidFill>
@@ -11213,7 +11212,7 @@
               </a:ln>
               <a:extLst>
                 <a:ext uri="{91240B29-F687-4f45-9708-019B960494DF}">
-                  <a14:hiddenLine xmlns:a14="http://schemas.microsoft.com/office/drawing/2010/main" xmlns="" w="9525">
+                  <a14:hiddenLine xmlns="" xmlns:a14="http://schemas.microsoft.com/office/drawing/2010/main" w="9525">
                     <a:solidFill>
                       <a:srgbClr val="000000"/>
                     </a:solidFill>
@@ -11303,7 +11302,7 @@
               </a:ln>
               <a:extLst>
                 <a:ext uri="{91240B29-F687-4f45-9708-019B960494DF}">
-                  <a14:hiddenLine xmlns:a14="http://schemas.microsoft.com/office/drawing/2010/main" xmlns="" w="9525">
+                  <a14:hiddenLine xmlns="" xmlns:a14="http://schemas.microsoft.com/office/drawing/2010/main" w="9525">
                     <a:solidFill>
                       <a:srgbClr val="000000"/>
                     </a:solidFill>
@@ -11368,7 +11367,7 @@
               </a:ln>
               <a:extLst>
                 <a:ext uri="{91240B29-F687-4f45-9708-019B960494DF}">
-                  <a14:hiddenLine xmlns:a14="http://schemas.microsoft.com/office/drawing/2010/main" xmlns="" w="9525">
+                  <a14:hiddenLine xmlns="" xmlns:a14="http://schemas.microsoft.com/office/drawing/2010/main" w="9525">
                     <a:solidFill>
                       <a:srgbClr val="000000"/>
                     </a:solidFill>
@@ -11458,7 +11457,7 @@
               </a:ln>
               <a:extLst>
                 <a:ext uri="{91240B29-F687-4f45-9708-019B960494DF}">
-                  <a14:hiddenLine xmlns:a14="http://schemas.microsoft.com/office/drawing/2010/main" xmlns="" w="9525">
+                  <a14:hiddenLine xmlns="" xmlns:a14="http://schemas.microsoft.com/office/drawing/2010/main" w="9525">
                     <a:solidFill>
                       <a:srgbClr val="000000"/>
                     </a:solidFill>
@@ -11526,7 +11525,7 @@
               </a:ln>
               <a:extLst>
                 <a:ext uri="{91240B29-F687-4f45-9708-019B960494DF}">
-                  <a14:hiddenLine xmlns:a14="http://schemas.microsoft.com/office/drawing/2010/main" xmlns="" w="9525">
+                  <a14:hiddenLine xmlns="" xmlns:a14="http://schemas.microsoft.com/office/drawing/2010/main" w="9525">
                     <a:solidFill>
                       <a:srgbClr val="000000"/>
                     </a:solidFill>
@@ -11616,7 +11615,7 @@
               </a:ln>
               <a:extLst>
                 <a:ext uri="{91240B29-F687-4f45-9708-019B960494DF}">
-                  <a14:hiddenLine xmlns:a14="http://schemas.microsoft.com/office/drawing/2010/main" xmlns="" w="9525">
+                  <a14:hiddenLine xmlns="" xmlns:a14="http://schemas.microsoft.com/office/drawing/2010/main" w="9525">
                     <a:solidFill>
                       <a:srgbClr val="000000"/>
                     </a:solidFill>
@@ -11684,7 +11683,7 @@
               </a:ln>
               <a:extLst>
                 <a:ext uri="{91240B29-F687-4f45-9708-019B960494DF}">
-                  <a14:hiddenLine xmlns:a14="http://schemas.microsoft.com/office/drawing/2010/main" xmlns="" w="9525">
+                  <a14:hiddenLine xmlns="" xmlns:a14="http://schemas.microsoft.com/office/drawing/2010/main" w="9525">
                     <a:solidFill>
                       <a:srgbClr val="000000"/>
                     </a:solidFill>
@@ -11774,7 +11773,7 @@
               </a:ln>
               <a:extLst>
                 <a:ext uri="{91240B29-F687-4f45-9708-019B960494DF}">
-                  <a14:hiddenLine xmlns:a14="http://schemas.microsoft.com/office/drawing/2010/main" xmlns="" w="9525">
+                  <a14:hiddenLine xmlns="" xmlns:a14="http://schemas.microsoft.com/office/drawing/2010/main" w="9525">
                     <a:solidFill>
                       <a:srgbClr val="000000"/>
                     </a:solidFill>
@@ -11808,7 +11807,7 @@
               </a:ln>
               <a:extLst>
                 <a:ext uri="{91240B29-F687-4f45-9708-019B960494DF}">
-                  <a14:hiddenLine xmlns:a14="http://schemas.microsoft.com/office/drawing/2010/main" xmlns="" w="9525">
+                  <a14:hiddenLine xmlns="" xmlns:a14="http://schemas.microsoft.com/office/drawing/2010/main" w="9525">
                     <a:solidFill>
                       <a:srgbClr val="000000"/>
                     </a:solidFill>
@@ -12370,7 +12369,7 @@
           <p:cNvPr id="2" name="Título 1">
             <a:extLst>
               <a:ext uri="{FF2B5EF4-FFF2-40B4-BE49-F238E27FC236}">
-                <a16:creationId xmlns:a16="http://schemas.microsoft.com/office/drawing/2014/main" xmlns="" id="{F00F1C45-C865-4935-94E7-572362398874}"/>
+                <a16:creationId xmlns="" xmlns:a16="http://schemas.microsoft.com/office/drawing/2014/main" id="{F00F1C45-C865-4935-94E7-572362398874}"/>
               </a:ext>
             </a:extLst>
           </p:cNvPr>
@@ -12399,7 +12398,7 @@
           <p:cNvPr id="3" name="Subtítulo 2">
             <a:extLst>
               <a:ext uri="{FF2B5EF4-FFF2-40B4-BE49-F238E27FC236}">
-                <a16:creationId xmlns:a16="http://schemas.microsoft.com/office/drawing/2014/main" xmlns="" id="{A1F7E72A-14F6-4067-B4D3-62DF07BDCA2F}"/>
+                <a16:creationId xmlns="" xmlns:a16="http://schemas.microsoft.com/office/drawing/2014/main" id="{A1F7E72A-14F6-4067-B4D3-62DF07BDCA2F}"/>
               </a:ext>
             </a:extLst>
           </p:cNvPr>
@@ -12459,7 +12458,7 @@
           <p:cNvPr id="5" name="Imagen 4">
             <a:extLst>
               <a:ext uri="{FF2B5EF4-FFF2-40B4-BE49-F238E27FC236}">
-                <a16:creationId xmlns:a16="http://schemas.microsoft.com/office/drawing/2014/main" xmlns="" id="{D9D1671C-CA93-4A23-A749-B712B244B4DC}"/>
+                <a16:creationId xmlns="" xmlns:a16="http://schemas.microsoft.com/office/drawing/2014/main" id="{D9D1671C-CA93-4A23-A749-B712B244B4DC}"/>
               </a:ext>
             </a:extLst>
           </p:cNvPr>
@@ -12519,7 +12518,7 @@
           <p:cNvPr id="3" name="Imagen 2">
             <a:extLst>
               <a:ext uri="{FF2B5EF4-FFF2-40B4-BE49-F238E27FC236}">
-                <a16:creationId xmlns:a16="http://schemas.microsoft.com/office/drawing/2014/main" xmlns="" id="{C819C49F-5FE6-4C50-88B2-6FCA8432F398}"/>
+                <a16:creationId xmlns="" xmlns:a16="http://schemas.microsoft.com/office/drawing/2014/main" id="{C819C49F-5FE6-4C50-88B2-6FCA8432F398}"/>
               </a:ext>
             </a:extLst>
           </p:cNvPr>
@@ -12579,7 +12578,7 @@
           <p:cNvPr id="3" name="Imagen 2">
             <a:extLst>
               <a:ext uri="{FF2B5EF4-FFF2-40B4-BE49-F238E27FC236}">
-                <a16:creationId xmlns:a16="http://schemas.microsoft.com/office/drawing/2014/main" xmlns="" id="{124C0477-68CD-4A8C-A7D3-FA87DD03ED40}"/>
+                <a16:creationId xmlns="" xmlns:a16="http://schemas.microsoft.com/office/drawing/2014/main" id="{124C0477-68CD-4A8C-A7D3-FA87DD03ED40}"/>
               </a:ext>
             </a:extLst>
           </p:cNvPr>
@@ -12639,7 +12638,7 @@
           <p:cNvPr id="3" name="Imagen 2">
             <a:extLst>
               <a:ext uri="{FF2B5EF4-FFF2-40B4-BE49-F238E27FC236}">
-                <a16:creationId xmlns:a16="http://schemas.microsoft.com/office/drawing/2014/main" xmlns="" id="{44C2976A-BDF3-488A-BEEF-01C58B8C09D1}"/>
+                <a16:creationId xmlns="" xmlns:a16="http://schemas.microsoft.com/office/drawing/2014/main" id="{44C2976A-BDF3-488A-BEEF-01C58B8C09D1}"/>
               </a:ext>
             </a:extLst>
           </p:cNvPr>
@@ -12699,7 +12698,7 @@
           <p:cNvPr id="3" name="Imagen 2">
             <a:extLst>
               <a:ext uri="{FF2B5EF4-FFF2-40B4-BE49-F238E27FC236}">
-                <a16:creationId xmlns:a16="http://schemas.microsoft.com/office/drawing/2014/main" xmlns="" id="{3B7EAF1F-7F84-4A8E-A448-B60200D103AD}"/>
+                <a16:creationId xmlns="" xmlns:a16="http://schemas.microsoft.com/office/drawing/2014/main" id="{3B7EAF1F-7F84-4A8E-A448-B60200D103AD}"/>
               </a:ext>
             </a:extLst>
           </p:cNvPr>
@@ -12759,7 +12758,7 @@
           <p:cNvPr id="3" name="Imagen 2">
             <a:extLst>
               <a:ext uri="{FF2B5EF4-FFF2-40B4-BE49-F238E27FC236}">
-                <a16:creationId xmlns:a16="http://schemas.microsoft.com/office/drawing/2014/main" xmlns="" id="{1B12D9E4-79DF-4620-871B-8E5EFCFDF971}"/>
+                <a16:creationId xmlns="" xmlns:a16="http://schemas.microsoft.com/office/drawing/2014/main" id="{1B12D9E4-79DF-4620-871B-8E5EFCFDF971}"/>
               </a:ext>
             </a:extLst>
           </p:cNvPr>
@@ -12819,7 +12818,7 @@
           <p:cNvPr id="3" name="Imagen 2">
             <a:extLst>
               <a:ext uri="{FF2B5EF4-FFF2-40B4-BE49-F238E27FC236}">
-                <a16:creationId xmlns:a16="http://schemas.microsoft.com/office/drawing/2014/main" xmlns="" id="{9D704219-3001-4D9B-BE7D-E76775C6E4FC}"/>
+                <a16:creationId xmlns="" xmlns:a16="http://schemas.microsoft.com/office/drawing/2014/main" id="{9D704219-3001-4D9B-BE7D-E76775C6E4FC}"/>
               </a:ext>
             </a:extLst>
           </p:cNvPr>
@@ -12879,7 +12878,7 @@
           <p:cNvPr id="3" name="Imagen 2">
             <a:extLst>
               <a:ext uri="{FF2B5EF4-FFF2-40B4-BE49-F238E27FC236}">
-                <a16:creationId xmlns:a16="http://schemas.microsoft.com/office/drawing/2014/main" xmlns="" id="{C62F0975-D1E1-4F0C-9F64-002B9CB469C3}"/>
+                <a16:creationId xmlns="" xmlns:a16="http://schemas.microsoft.com/office/drawing/2014/main" id="{C62F0975-D1E1-4F0C-9F64-002B9CB469C3}"/>
               </a:ext>
             </a:extLst>
           </p:cNvPr>
@@ -12934,79 +12933,12 @@
           <a:chExt cx="0" cy="0"/>
         </a:xfrm>
       </p:grpSpPr>
-      <p:pic>
-        <p:nvPicPr>
-          <p:cNvPr id="3" name="Imagen 2">
-            <a:extLst>
-              <a:ext uri="{FF2B5EF4-FFF2-40B4-BE49-F238E27FC236}">
-                <a16:creationId xmlns:a16="http://schemas.microsoft.com/office/drawing/2014/main" xmlns="" id="{160C3B01-013E-4E73-8129-1C4BFF03ADD4}"/>
-              </a:ext>
-            </a:extLst>
-          </p:cNvPr>
-          <p:cNvPicPr>
-            <a:picLocks noChangeAspect="1"/>
-          </p:cNvPicPr>
-          <p:nvPr/>
-        </p:nvPicPr>
-        <p:blipFill>
-          <a:blip r:embed="rId2"/>
-          <a:stretch>
-            <a:fillRect/>
-          </a:stretch>
-        </p:blipFill>
-        <p:spPr>
-          <a:xfrm>
-            <a:off x="1221828" y="0"/>
-            <a:ext cx="9748344" cy="6858000"/>
-          </a:xfrm>
-          <a:prstGeom prst="rect">
-            <a:avLst/>
-          </a:prstGeom>
-        </p:spPr>
-      </p:pic>
-    </p:spTree>
-    <p:extLst>
-      <p:ext uri="{BB962C8B-B14F-4D97-AF65-F5344CB8AC3E}">
-        <p14:creationId xmlns:p14="http://schemas.microsoft.com/office/powerpoint/2010/main" val="3904025039"/>
-      </p:ext>
-    </p:extLst>
-  </p:cSld>
-  <p:clrMapOvr>
-    <a:masterClrMapping/>
-  </p:clrMapOvr>
-  <p:timing>
-    <p:tnLst>
-      <p:par>
-        <p:cTn id="1" dur="indefinite" restart="never" nodeType="tmRoot"/>
-      </p:par>
-    </p:tnLst>
-  </p:timing>
-</p:sld>
-</file>
-
-<file path=ppt/slides/slide18.xml><?xml version="1.0" encoding="utf-8"?>
-<p:sld xmlns:a="http://schemas.openxmlformats.org/drawingml/2006/main" xmlns:r="http://schemas.openxmlformats.org/officeDocument/2006/relationships" xmlns:p="http://schemas.openxmlformats.org/presentationml/2006/main">
-  <p:cSld>
-    <p:spTree>
-      <p:nvGrpSpPr>
-        <p:cNvPr id="1" name=""/>
-        <p:cNvGrpSpPr/>
-        <p:nvPr/>
-      </p:nvGrpSpPr>
-      <p:grpSpPr>
-        <a:xfrm>
-          <a:off x="0" y="0"/>
-          <a:ext cx="0" cy="0"/>
-          <a:chOff x="0" y="0"/>
-          <a:chExt cx="0" cy="0"/>
-        </a:xfrm>
-      </p:grpSpPr>
       <p:sp>
         <p:nvSpPr>
           <p:cNvPr id="2" name="Título 1">
             <a:extLst>
               <a:ext uri="{FF2B5EF4-FFF2-40B4-BE49-F238E27FC236}">
-                <a16:creationId xmlns:a16="http://schemas.microsoft.com/office/drawing/2014/main" xmlns="" id="{75284E46-0A42-48E3-8035-992BC5F52B19}"/>
+                <a16:creationId xmlns="" xmlns:a16="http://schemas.microsoft.com/office/drawing/2014/main" id="{75284E46-0A42-48E3-8035-992BC5F52B19}"/>
               </a:ext>
             </a:extLst>
           </p:cNvPr>
@@ -13121,7 +13053,7 @@
           <p:cNvPr id="2" name="Título 1">
             <a:extLst>
               <a:ext uri="{FF2B5EF4-FFF2-40B4-BE49-F238E27FC236}">
-                <a16:creationId xmlns:a16="http://schemas.microsoft.com/office/drawing/2014/main" xmlns="" id="{75284E46-0A42-48E3-8035-992BC5F52B19}"/>
+                <a16:creationId xmlns="" xmlns:a16="http://schemas.microsoft.com/office/drawing/2014/main" id="{75284E46-0A42-48E3-8035-992BC5F52B19}"/>
               </a:ext>
             </a:extLst>
           </p:cNvPr>
@@ -13155,7 +13087,7 @@
           <p:cNvPr id="6" name="Imagen 5">
             <a:extLst>
               <a:ext uri="{FF2B5EF4-FFF2-40B4-BE49-F238E27FC236}">
-                <a16:creationId xmlns:a16="http://schemas.microsoft.com/office/drawing/2014/main" xmlns="" id="{4284C0F8-8E26-4F83-A9B5-2B656D43693A}"/>
+                <a16:creationId xmlns="" xmlns:a16="http://schemas.microsoft.com/office/drawing/2014/main" id="{4284C0F8-8E26-4F83-A9B5-2B656D43693A}"/>
               </a:ext>
             </a:extLst>
           </p:cNvPr>
@@ -13185,7 +13117,7 @@
           <p:cNvPr id="8" name="Imagen 7">
             <a:extLst>
               <a:ext uri="{FF2B5EF4-FFF2-40B4-BE49-F238E27FC236}">
-                <a16:creationId xmlns:a16="http://schemas.microsoft.com/office/drawing/2014/main" xmlns="" id="{875B015C-3FF4-4383-BEE4-4E2F7F7B0BB4}"/>
+                <a16:creationId xmlns="" xmlns:a16="http://schemas.microsoft.com/office/drawing/2014/main" id="{875B015C-3FF4-4383-BEE4-4E2F7F7B0BB4}"/>
               </a:ext>
             </a:extLst>
           </p:cNvPr>
@@ -13215,7 +13147,7 @@
           <p:cNvPr id="10" name="Imagen 9">
             <a:extLst>
               <a:ext uri="{FF2B5EF4-FFF2-40B4-BE49-F238E27FC236}">
-                <a16:creationId xmlns:a16="http://schemas.microsoft.com/office/drawing/2014/main" xmlns="" id="{9525026B-00E3-4213-90B0-61D238F84575}"/>
+                <a16:creationId xmlns="" xmlns:a16="http://schemas.microsoft.com/office/drawing/2014/main" id="{9525026B-00E3-4213-90B0-61D238F84575}"/>
               </a:ext>
             </a:extLst>
           </p:cNvPr>
@@ -13245,7 +13177,7 @@
           <p:cNvPr id="11" name="Título 1">
             <a:extLst>
               <a:ext uri="{FF2B5EF4-FFF2-40B4-BE49-F238E27FC236}">
-                <a16:creationId xmlns:a16="http://schemas.microsoft.com/office/drawing/2014/main" xmlns="" id="{87AD5685-ECE1-445E-8D17-1A0D54AF3BF4}"/>
+                <a16:creationId xmlns="" xmlns:a16="http://schemas.microsoft.com/office/drawing/2014/main" id="{87AD5685-ECE1-445E-8D17-1A0D54AF3BF4}"/>
               </a:ext>
             </a:extLst>
           </p:cNvPr>
@@ -13300,7 +13232,7 @@
           <p:cNvPr id="12" name="Título 1">
             <a:extLst>
               <a:ext uri="{FF2B5EF4-FFF2-40B4-BE49-F238E27FC236}">
-                <a16:creationId xmlns:a16="http://schemas.microsoft.com/office/drawing/2014/main" xmlns="" id="{CF7A3351-E942-4C54-8BC3-06222AEBF0B7}"/>
+                <a16:creationId xmlns="" xmlns:a16="http://schemas.microsoft.com/office/drawing/2014/main" id="{CF7A3351-E942-4C54-8BC3-06222AEBF0B7}"/>
               </a:ext>
             </a:extLst>
           </p:cNvPr>
@@ -13355,7 +13287,7 @@
           <p:cNvPr id="13" name="Título 1">
             <a:extLst>
               <a:ext uri="{FF2B5EF4-FFF2-40B4-BE49-F238E27FC236}">
-                <a16:creationId xmlns:a16="http://schemas.microsoft.com/office/drawing/2014/main" xmlns="" id="{8295CD05-6EEB-4B9D-938F-041BC048030C}"/>
+                <a16:creationId xmlns="" xmlns:a16="http://schemas.microsoft.com/office/drawing/2014/main" id="{8295CD05-6EEB-4B9D-938F-041BC048030C}"/>
               </a:ext>
             </a:extLst>
           </p:cNvPr>
@@ -13440,7 +13372,7 @@
           <p:cNvPr id="2" name="Título 1">
             <a:extLst>
               <a:ext uri="{FF2B5EF4-FFF2-40B4-BE49-F238E27FC236}">
-                <a16:creationId xmlns:a16="http://schemas.microsoft.com/office/drawing/2014/main" xmlns="" id="{5BA0D553-22A3-4E10-A582-38C3CDC203AB}"/>
+                <a16:creationId xmlns="" xmlns:a16="http://schemas.microsoft.com/office/drawing/2014/main" id="{5BA0D553-22A3-4E10-A582-38C3CDC203AB}"/>
               </a:ext>
             </a:extLst>
           </p:cNvPr>
@@ -13506,7 +13438,7 @@
           <p:cNvPr id="3" name="Imagen 2">
             <a:extLst>
               <a:ext uri="{FF2B5EF4-FFF2-40B4-BE49-F238E27FC236}">
-                <a16:creationId xmlns:a16="http://schemas.microsoft.com/office/drawing/2014/main" xmlns="" id="{B33B9D7C-EA46-4B2C-9065-0986F011B726}"/>
+                <a16:creationId xmlns="" xmlns:a16="http://schemas.microsoft.com/office/drawing/2014/main" id="{B33B9D7C-EA46-4B2C-9065-0986F011B726}"/>
               </a:ext>
             </a:extLst>
           </p:cNvPr>
@@ -13566,7 +13498,7 @@
           <p:cNvPr id="3" name="Imagen 2">
             <a:extLst>
               <a:ext uri="{FF2B5EF4-FFF2-40B4-BE49-F238E27FC236}">
-                <a16:creationId xmlns:a16="http://schemas.microsoft.com/office/drawing/2014/main" xmlns="" id="{9D229041-ED79-4C08-9F5B-F09FA9021137}"/>
+                <a16:creationId xmlns="" xmlns:a16="http://schemas.microsoft.com/office/drawing/2014/main" id="{9D229041-ED79-4C08-9F5B-F09FA9021137}"/>
               </a:ext>
             </a:extLst>
           </p:cNvPr>
@@ -13626,7 +13558,7 @@
           <p:cNvPr id="3" name="Imagen 2">
             <a:extLst>
               <a:ext uri="{FF2B5EF4-FFF2-40B4-BE49-F238E27FC236}">
-                <a16:creationId xmlns:a16="http://schemas.microsoft.com/office/drawing/2014/main" xmlns="" id="{38FB5474-7FCC-44E9-9096-1299E61F5E92}"/>
+                <a16:creationId xmlns="" xmlns:a16="http://schemas.microsoft.com/office/drawing/2014/main" id="{38FB5474-7FCC-44E9-9096-1299E61F5E92}"/>
               </a:ext>
             </a:extLst>
           </p:cNvPr>
@@ -13686,7 +13618,7 @@
           <p:cNvPr id="3" name="Imagen 2">
             <a:extLst>
               <a:ext uri="{FF2B5EF4-FFF2-40B4-BE49-F238E27FC236}">
-                <a16:creationId xmlns:a16="http://schemas.microsoft.com/office/drawing/2014/main" xmlns="" id="{CEFD6630-EABB-4A4D-A230-0307100D0CF3}"/>
+                <a16:creationId xmlns="" xmlns:a16="http://schemas.microsoft.com/office/drawing/2014/main" id="{CEFD6630-EABB-4A4D-A230-0307100D0CF3}"/>
               </a:ext>
             </a:extLst>
           </p:cNvPr>
@@ -13746,7 +13678,7 @@
           <p:cNvPr id="3" name="Imagen 2">
             <a:extLst>
               <a:ext uri="{FF2B5EF4-FFF2-40B4-BE49-F238E27FC236}">
-                <a16:creationId xmlns:a16="http://schemas.microsoft.com/office/drawing/2014/main" xmlns="" id="{BCA70E0C-FB1B-46B2-9F37-F40A281B8D01}"/>
+                <a16:creationId xmlns="" xmlns:a16="http://schemas.microsoft.com/office/drawing/2014/main" id="{BCA70E0C-FB1B-46B2-9F37-F40A281B8D01}"/>
               </a:ext>
             </a:extLst>
           </p:cNvPr>
@@ -13806,7 +13738,7 @@
           <p:cNvPr id="3" name="Imagen 2">
             <a:extLst>
               <a:ext uri="{FF2B5EF4-FFF2-40B4-BE49-F238E27FC236}">
-                <a16:creationId xmlns:a16="http://schemas.microsoft.com/office/drawing/2014/main" xmlns="" id="{18D0CAFB-EE3C-417F-B0CA-280A4E9B4AAE}"/>
+                <a16:creationId xmlns="" xmlns:a16="http://schemas.microsoft.com/office/drawing/2014/main" id="{18D0CAFB-EE3C-417F-B0CA-280A4E9B4AAE}"/>
               </a:ext>
             </a:extLst>
           </p:cNvPr>

</xml_diff>

<commit_message>
Actualizacion ppt 1 presentacion
actualizacion
</commit_message>
<xml_diff>
--- a/Documentacion/Power Point Para 1 Presentacion/Sistema de Gestión hostal doña clarita 14 ppt.pptx
+++ b/Documentacion/Power Point Para 1 Presentacion/Sistema de Gestión hostal doña clarita 14 ppt.pptx
@@ -10,13 +10,13 @@
     <p:sldId id="275" r:id="rId4"/>
     <p:sldId id="276" r:id="rId5"/>
     <p:sldId id="258" r:id="rId6"/>
-    <p:sldId id="259" r:id="rId7"/>
-    <p:sldId id="260" r:id="rId8"/>
-    <p:sldId id="261" r:id="rId9"/>
-    <p:sldId id="262" r:id="rId10"/>
-    <p:sldId id="269" r:id="rId11"/>
-    <p:sldId id="263" r:id="rId12"/>
-    <p:sldId id="270" r:id="rId13"/>
+    <p:sldId id="262" r:id="rId7"/>
+    <p:sldId id="269" r:id="rId8"/>
+    <p:sldId id="260" r:id="rId9"/>
+    <p:sldId id="259" r:id="rId10"/>
+    <p:sldId id="261" r:id="rId11"/>
+    <p:sldId id="270" r:id="rId12"/>
+    <p:sldId id="263" r:id="rId13"/>
     <p:sldId id="264" r:id="rId14"/>
     <p:sldId id="265" r:id="rId15"/>
     <p:sldId id="266" r:id="rId16"/>
@@ -129,10 +129,6 @@
     </p:ext>
   </p:extLst>
 </p:presentation>
-</file>
-
-<file path=ppt/revisionInfo.xml><?xml version="1.0" encoding="utf-8"?>
-<p1510:revInfo xmlns:a="http://schemas.openxmlformats.org/drawingml/2006/main" xmlns:r="http://schemas.openxmlformats.org/officeDocument/2006/relationships" xmlns:p1510="http://schemas.microsoft.com/office/powerpoint/2015/10/main"/>
 </file>
 
 <file path=ppt/slideLayouts/slideLayout1.xml><?xml version="1.0" encoding="utf-8"?>
@@ -4417,7 +4413,7 @@
           <a:p>
             <a:fld id="{48A87A34-81AB-432B-8DAE-1953F412C126}" type="datetimeFigureOut">
               <a:rPr lang="en-US" dirty="0"/>
-              <a:t>4/16/2018</a:t>
+              <a:t>4/22/2018</a:t>
             </a:fld>
             <a:endParaRPr lang="en-US" dirty="0"/>
           </a:p>
@@ -4679,7 +4675,7 @@
           <a:p>
             <a:fld id="{48A87A34-81AB-432B-8DAE-1953F412C126}" type="datetimeFigureOut">
               <a:rPr lang="en-US" dirty="0"/>
-              <a:t>4/16/2018</a:t>
+              <a:t>4/22/2018</a:t>
             </a:fld>
             <a:endParaRPr lang="en-US" dirty="0"/>
           </a:p>
@@ -4870,7 +4866,7 @@
           <a:p>
             <a:fld id="{48A87A34-81AB-432B-8DAE-1953F412C126}" type="datetimeFigureOut">
               <a:rPr lang="en-US" dirty="0"/>
-              <a:t>4/16/2018</a:t>
+              <a:t>4/22/2018</a:t>
             </a:fld>
             <a:endParaRPr lang="en-US" dirty="0"/>
           </a:p>
@@ -5128,7 +5124,7 @@
           <a:p>
             <a:fld id="{48A87A34-81AB-432B-8DAE-1953F412C126}" type="datetimeFigureOut">
               <a:rPr lang="en-US" dirty="0"/>
-              <a:t>4/16/2018</a:t>
+              <a:t>4/22/2018</a:t>
             </a:fld>
             <a:endParaRPr lang="en-US" dirty="0"/>
           </a:p>
@@ -5557,7 +5553,7 @@
           <a:p>
             <a:fld id="{48A87A34-81AB-432B-8DAE-1953F412C126}" type="datetimeFigureOut">
               <a:rPr lang="en-US" dirty="0"/>
-              <a:t>4/16/2018</a:t>
+              <a:t>4/22/2018</a:t>
             </a:fld>
             <a:endParaRPr lang="en-US" dirty="0"/>
           </a:p>
@@ -6098,7 +6094,7 @@
           <a:p>
             <a:fld id="{48A87A34-81AB-432B-8DAE-1953F412C126}" type="datetimeFigureOut">
               <a:rPr lang="en-US" dirty="0"/>
-              <a:t>4/16/2018</a:t>
+              <a:t>4/22/2018</a:t>
             </a:fld>
             <a:endParaRPr lang="en-US" dirty="0"/>
           </a:p>
@@ -6813,7 +6809,7 @@
           <a:p>
             <a:fld id="{48A87A34-81AB-432B-8DAE-1953F412C126}" type="datetimeFigureOut">
               <a:rPr lang="en-US" dirty="0"/>
-              <a:t>4/16/2018</a:t>
+              <a:t>4/22/2018</a:t>
             </a:fld>
             <a:endParaRPr lang="en-US" dirty="0"/>
           </a:p>
@@ -6978,7 +6974,7 @@
           <a:p>
             <a:fld id="{48A87A34-81AB-432B-8DAE-1953F412C126}" type="datetimeFigureOut">
               <a:rPr lang="en-US" dirty="0"/>
-              <a:t>4/16/2018</a:t>
+              <a:t>4/22/2018</a:t>
             </a:fld>
             <a:endParaRPr lang="en-US" dirty="0"/>
           </a:p>
@@ -7153,7 +7149,7 @@
           <a:p>
             <a:fld id="{48A87A34-81AB-432B-8DAE-1953F412C126}" type="datetimeFigureOut">
               <a:rPr lang="en-US" dirty="0"/>
-              <a:t>4/16/2018</a:t>
+              <a:t>4/22/2018</a:t>
             </a:fld>
             <a:endParaRPr lang="en-US" dirty="0"/>
           </a:p>
@@ -7318,7 +7314,7 @@
           <a:p>
             <a:fld id="{48A87A34-81AB-432B-8DAE-1953F412C126}" type="datetimeFigureOut">
               <a:rPr lang="en-US" dirty="0"/>
-              <a:t>4/16/2018</a:t>
+              <a:t>4/22/2018</a:t>
             </a:fld>
             <a:endParaRPr lang="en-US" dirty="0"/>
           </a:p>
@@ -7563,7 +7559,7 @@
           <a:p>
             <a:fld id="{48A87A34-81AB-432B-8DAE-1953F412C126}" type="datetimeFigureOut">
               <a:rPr lang="en-US" dirty="0"/>
-              <a:t>4/16/2018</a:t>
+              <a:t>4/22/2018</a:t>
             </a:fld>
             <a:endParaRPr lang="en-US" dirty="0"/>
           </a:p>
@@ -7790,7 +7786,7 @@
           <a:p>
             <a:fld id="{48A87A34-81AB-432B-8DAE-1953F412C126}" type="datetimeFigureOut">
               <a:rPr lang="en-US" dirty="0"/>
-              <a:t>4/16/2018</a:t>
+              <a:t>4/22/2018</a:t>
             </a:fld>
             <a:endParaRPr lang="en-US" dirty="0"/>
           </a:p>
@@ -8166,7 +8162,7 @@
           <a:p>
             <a:fld id="{48A87A34-81AB-432B-8DAE-1953F412C126}" type="datetimeFigureOut">
               <a:rPr lang="en-US" dirty="0"/>
-              <a:t>4/16/2018</a:t>
+              <a:t>4/22/2018</a:t>
             </a:fld>
             <a:endParaRPr lang="en-US" dirty="0"/>
           </a:p>
@@ -8279,7 +8275,7 @@
           <a:p>
             <a:fld id="{48A87A34-81AB-432B-8DAE-1953F412C126}" type="datetimeFigureOut">
               <a:rPr lang="en-US" dirty="0"/>
-              <a:t>4/16/2018</a:t>
+              <a:t>4/22/2018</a:t>
             </a:fld>
             <a:endParaRPr lang="en-US" dirty="0"/>
           </a:p>
@@ -8369,7 +8365,7 @@
           <a:p>
             <a:fld id="{48A87A34-81AB-432B-8DAE-1953F412C126}" type="datetimeFigureOut">
               <a:rPr lang="en-US" dirty="0"/>
-              <a:t>4/16/2018</a:t>
+              <a:t>4/22/2018</a:t>
             </a:fld>
             <a:endParaRPr lang="en-US" dirty="0"/>
           </a:p>
@@ -8613,7 +8609,7 @@
           <a:p>
             <a:fld id="{48A87A34-81AB-432B-8DAE-1953F412C126}" type="datetimeFigureOut">
               <a:rPr lang="en-US" dirty="0"/>
-              <a:t>4/16/2018</a:t>
+              <a:t>4/22/2018</a:t>
             </a:fld>
             <a:endParaRPr lang="en-US" dirty="0"/>
           </a:p>
@@ -8888,7 +8884,7 @@
           <a:p>
             <a:fld id="{48A87A34-81AB-432B-8DAE-1953F412C126}" type="datetimeFigureOut">
               <a:rPr lang="en-US" dirty="0"/>
-              <a:t>4/16/2018</a:t>
+              <a:t>4/22/2018</a:t>
             </a:fld>
             <a:endParaRPr lang="en-US" dirty="0"/>
           </a:p>
@@ -11951,7 +11947,7 @@
             <a:fld id="{48A87A34-81AB-432B-8DAE-1953F412C126}" type="datetimeFigureOut">
               <a:rPr lang="en-US" dirty="0"/>
               <a:pPr/>
-              <a:t>4/16/2018</a:t>
+              <a:t>4/22/2018</a:t>
             </a:fld>
             <a:endParaRPr lang="en-US" dirty="0"/>
           </a:p>
@@ -12372,7 +12368,7 @@
           <p:cNvPr id="2" name="Título 1">
             <a:extLst>
               <a:ext uri="{FF2B5EF4-FFF2-40B4-BE49-F238E27FC236}">
-                <a16:creationId xmlns="" xmlns:a16="http://schemas.microsoft.com/office/drawing/2014/main" id="{F00F1C45-C865-4935-94E7-572362398874}"/>
+                <a16:creationId xmlns:a16="http://schemas.microsoft.com/office/drawing/2014/main" id="{F00F1C45-C865-4935-94E7-572362398874}"/>
               </a:ext>
             </a:extLst>
           </p:cNvPr>
@@ -12401,7 +12397,7 @@
           <p:cNvPr id="3" name="Subtítulo 2">
             <a:extLst>
               <a:ext uri="{FF2B5EF4-FFF2-40B4-BE49-F238E27FC236}">
-                <a16:creationId xmlns="" xmlns:a16="http://schemas.microsoft.com/office/drawing/2014/main" id="{A1F7E72A-14F6-4067-B4D3-62DF07BDCA2F}"/>
+                <a16:creationId xmlns:a16="http://schemas.microsoft.com/office/drawing/2014/main" id="{A1F7E72A-14F6-4067-B4D3-62DF07BDCA2F}"/>
               </a:ext>
             </a:extLst>
           </p:cNvPr>
@@ -12461,7 +12457,7 @@
           <p:cNvPr id="5" name="Imagen 4">
             <a:extLst>
               <a:ext uri="{FF2B5EF4-FFF2-40B4-BE49-F238E27FC236}">
-                <a16:creationId xmlns="" xmlns:a16="http://schemas.microsoft.com/office/drawing/2014/main" id="{D9D1671C-CA93-4A23-A749-B712B244B4DC}"/>
+                <a16:creationId xmlns:a16="http://schemas.microsoft.com/office/drawing/2014/main" id="{D9D1671C-CA93-4A23-A749-B712B244B4DC}"/>
               </a:ext>
             </a:extLst>
           </p:cNvPr>
@@ -12496,13 +12492,6 @@
   <p:clrMapOvr>
     <a:masterClrMapping/>
   </p:clrMapOvr>
-  <p:timing>
-    <p:tnLst>
-      <p:par>
-        <p:cTn id="1" dur="indefinite" restart="never" nodeType="tmRoot"/>
-      </p:par>
-    </p:tnLst>
-  </p:timing>
 </p:sld>
 </file>
 
@@ -12528,7 +12517,7 @@
           <p:cNvPr id="3" name="Imagen 2">
             <a:extLst>
               <a:ext uri="{FF2B5EF4-FFF2-40B4-BE49-F238E27FC236}">
-                <a16:creationId xmlns="" xmlns:a16="http://schemas.microsoft.com/office/drawing/2014/main" id="{BCA70E0C-FB1B-46B2-9F37-F40A281B8D01}"/>
+                <a16:creationId xmlns:a16="http://schemas.microsoft.com/office/drawing/2014/main" id="{38FB5474-7FCC-44E9-9096-1299E61F5E92}"/>
               </a:ext>
             </a:extLst>
           </p:cNvPr>
@@ -12545,8 +12534,8 @@
         </p:blipFill>
         <p:spPr>
           <a:xfrm>
-            <a:off x="1248551" y="0"/>
-            <a:ext cx="9694896" cy="6858000"/>
+            <a:off x="1245557" y="0"/>
+            <a:ext cx="9700886" cy="6858000"/>
           </a:xfrm>
           <a:prstGeom prst="rect">
             <a:avLst/>
@@ -12556,20 +12545,13 @@
     </p:spTree>
     <p:extLst>
       <p:ext uri="{BB962C8B-B14F-4D97-AF65-F5344CB8AC3E}">
-        <p14:creationId xmlns:p14="http://schemas.microsoft.com/office/powerpoint/2010/main" val="2113794953"/>
+        <p14:creationId xmlns:p14="http://schemas.microsoft.com/office/powerpoint/2010/main" val="925268731"/>
       </p:ext>
     </p:extLst>
   </p:cSld>
   <p:clrMapOvr>
     <a:masterClrMapping/>
   </p:clrMapOvr>
-  <p:timing>
-    <p:tnLst>
-      <p:par>
-        <p:cTn id="1" dur="indefinite" restart="never" nodeType="tmRoot"/>
-      </p:par>
-    </p:tnLst>
-  </p:timing>
 </p:sld>
 </file>
 
@@ -12592,10 +12574,70 @@
       </p:grpSpPr>
       <p:pic>
         <p:nvPicPr>
+          <p:cNvPr id="4" name="Imagen 3">
+            <a:extLst>
+              <a:ext uri="{FF2B5EF4-FFF2-40B4-BE49-F238E27FC236}">
+                <a16:creationId xmlns:a16="http://schemas.microsoft.com/office/drawing/2014/main" id="{C5069487-2EE9-4257-97B7-69E0FE42134B}"/>
+              </a:ext>
+            </a:extLst>
+          </p:cNvPr>
+          <p:cNvPicPr>
+            <a:picLocks noChangeAspect="1"/>
+          </p:cNvPicPr>
+          <p:nvPr/>
+        </p:nvPicPr>
+        <p:blipFill>
+          <a:blip r:embed="rId2"/>
+          <a:stretch>
+            <a:fillRect/>
+          </a:stretch>
+        </p:blipFill>
+        <p:spPr>
+          <a:xfrm>
+            <a:off x="1222719" y="4225"/>
+            <a:ext cx="9740555" cy="6853775"/>
+          </a:xfrm>
+          <a:prstGeom prst="rect">
+            <a:avLst/>
+          </a:prstGeom>
+        </p:spPr>
+      </p:pic>
+    </p:spTree>
+    <p:extLst>
+      <p:ext uri="{BB962C8B-B14F-4D97-AF65-F5344CB8AC3E}">
+        <p14:creationId xmlns:p14="http://schemas.microsoft.com/office/powerpoint/2010/main" val="1396099082"/>
+      </p:ext>
+    </p:extLst>
+  </p:cSld>
+  <p:clrMapOvr>
+    <a:masterClrMapping/>
+  </p:clrMapOvr>
+</p:sld>
+</file>
+
+<file path=ppt/slides/slide12.xml><?xml version="1.0" encoding="utf-8"?>
+<p:sld xmlns:a="http://schemas.openxmlformats.org/drawingml/2006/main" xmlns:r="http://schemas.openxmlformats.org/officeDocument/2006/relationships" xmlns:p="http://schemas.openxmlformats.org/presentationml/2006/main">
+  <p:cSld>
+    <p:spTree>
+      <p:nvGrpSpPr>
+        <p:cNvPr id="1" name=""/>
+        <p:cNvGrpSpPr/>
+        <p:nvPr/>
+      </p:nvGrpSpPr>
+      <p:grpSpPr>
+        <a:xfrm>
+          <a:off x="0" y="0"/>
+          <a:ext cx="0" cy="0"/>
+          <a:chOff x="0" y="0"/>
+          <a:chExt cx="0" cy="0"/>
+        </a:xfrm>
+      </p:grpSpPr>
+      <p:pic>
+        <p:nvPicPr>
           <p:cNvPr id="3" name="Imagen 2">
             <a:extLst>
               <a:ext uri="{FF2B5EF4-FFF2-40B4-BE49-F238E27FC236}">
-                <a16:creationId xmlns="" xmlns:a16="http://schemas.microsoft.com/office/drawing/2014/main" id="{18D0CAFB-EE3C-417F-B0CA-280A4E9B4AAE}"/>
+                <a16:creationId xmlns:a16="http://schemas.microsoft.com/office/drawing/2014/main" id="{18D0CAFB-EE3C-417F-B0CA-280A4E9B4AAE}"/>
               </a:ext>
             </a:extLst>
           </p:cNvPr>
@@ -12630,80 +12672,6 @@
   <p:clrMapOvr>
     <a:masterClrMapping/>
   </p:clrMapOvr>
-  <p:timing>
-    <p:tnLst>
-      <p:par>
-        <p:cTn id="1" dur="indefinite" restart="never" nodeType="tmRoot"/>
-      </p:par>
-    </p:tnLst>
-  </p:timing>
-</p:sld>
-</file>
-
-<file path=ppt/slides/slide12.xml><?xml version="1.0" encoding="utf-8"?>
-<p:sld xmlns:a="http://schemas.openxmlformats.org/drawingml/2006/main" xmlns:r="http://schemas.openxmlformats.org/officeDocument/2006/relationships" xmlns:p="http://schemas.openxmlformats.org/presentationml/2006/main">
-  <p:cSld>
-    <p:spTree>
-      <p:nvGrpSpPr>
-        <p:cNvPr id="1" name=""/>
-        <p:cNvGrpSpPr/>
-        <p:nvPr/>
-      </p:nvGrpSpPr>
-      <p:grpSpPr>
-        <a:xfrm>
-          <a:off x="0" y="0"/>
-          <a:ext cx="0" cy="0"/>
-          <a:chOff x="0" y="0"/>
-          <a:chExt cx="0" cy="0"/>
-        </a:xfrm>
-      </p:grpSpPr>
-      <p:pic>
-        <p:nvPicPr>
-          <p:cNvPr id="3" name="Imagen 2">
-            <a:extLst>
-              <a:ext uri="{FF2B5EF4-FFF2-40B4-BE49-F238E27FC236}">
-                <a16:creationId xmlns="" xmlns:a16="http://schemas.microsoft.com/office/drawing/2014/main" id="{C819C49F-5FE6-4C50-88B2-6FCA8432F398}"/>
-              </a:ext>
-            </a:extLst>
-          </p:cNvPr>
-          <p:cNvPicPr>
-            <a:picLocks noChangeAspect="1"/>
-          </p:cNvPicPr>
-          <p:nvPr/>
-        </p:nvPicPr>
-        <p:blipFill>
-          <a:blip r:embed="rId2"/>
-          <a:stretch>
-            <a:fillRect/>
-          </a:stretch>
-        </p:blipFill>
-        <p:spPr>
-          <a:xfrm>
-            <a:off x="1270721" y="0"/>
-            <a:ext cx="9650557" cy="6858000"/>
-          </a:xfrm>
-          <a:prstGeom prst="rect">
-            <a:avLst/>
-          </a:prstGeom>
-        </p:spPr>
-      </p:pic>
-    </p:spTree>
-    <p:extLst>
-      <p:ext uri="{BB962C8B-B14F-4D97-AF65-F5344CB8AC3E}">
-        <p14:creationId xmlns:p14="http://schemas.microsoft.com/office/powerpoint/2010/main" val="1396099082"/>
-      </p:ext>
-    </p:extLst>
-  </p:cSld>
-  <p:clrMapOvr>
-    <a:masterClrMapping/>
-  </p:clrMapOvr>
-  <p:timing>
-    <p:tnLst>
-      <p:par>
-        <p:cTn id="1" dur="indefinite" restart="never" nodeType="tmRoot"/>
-      </p:par>
-    </p:tnLst>
-  </p:timing>
 </p:sld>
 </file>
 
@@ -12729,7 +12697,7 @@
           <p:cNvPr id="3" name="Imagen 2">
             <a:extLst>
               <a:ext uri="{FF2B5EF4-FFF2-40B4-BE49-F238E27FC236}">
-                <a16:creationId xmlns="" xmlns:a16="http://schemas.microsoft.com/office/drawing/2014/main" id="{124C0477-68CD-4A8C-A7D3-FA87DD03ED40}"/>
+                <a16:creationId xmlns:a16="http://schemas.microsoft.com/office/drawing/2014/main" id="{124C0477-68CD-4A8C-A7D3-FA87DD03ED40}"/>
               </a:ext>
             </a:extLst>
           </p:cNvPr>
@@ -12764,13 +12732,6 @@
   <p:clrMapOvr>
     <a:masterClrMapping/>
   </p:clrMapOvr>
-  <p:timing>
-    <p:tnLst>
-      <p:par>
-        <p:cTn id="1" dur="indefinite" restart="never" nodeType="tmRoot"/>
-      </p:par>
-    </p:tnLst>
-  </p:timing>
 </p:sld>
 </file>
 
@@ -12796,7 +12757,7 @@
           <p:cNvPr id="3" name="Imagen 2">
             <a:extLst>
               <a:ext uri="{FF2B5EF4-FFF2-40B4-BE49-F238E27FC236}">
-                <a16:creationId xmlns="" xmlns:a16="http://schemas.microsoft.com/office/drawing/2014/main" id="{44C2976A-BDF3-488A-BEEF-01C58B8C09D1}"/>
+                <a16:creationId xmlns:a16="http://schemas.microsoft.com/office/drawing/2014/main" id="{44C2976A-BDF3-488A-BEEF-01C58B8C09D1}"/>
               </a:ext>
             </a:extLst>
           </p:cNvPr>
@@ -12831,13 +12792,6 @@
   <p:clrMapOvr>
     <a:masterClrMapping/>
   </p:clrMapOvr>
-  <p:timing>
-    <p:tnLst>
-      <p:par>
-        <p:cTn id="1" dur="indefinite" restart="never" nodeType="tmRoot"/>
-      </p:par>
-    </p:tnLst>
-  </p:timing>
 </p:sld>
 </file>
 
@@ -12863,7 +12817,7 @@
           <p:cNvPr id="3" name="Imagen 2">
             <a:extLst>
               <a:ext uri="{FF2B5EF4-FFF2-40B4-BE49-F238E27FC236}">
-                <a16:creationId xmlns="" xmlns:a16="http://schemas.microsoft.com/office/drawing/2014/main" id="{3B7EAF1F-7F84-4A8E-A448-B60200D103AD}"/>
+                <a16:creationId xmlns:a16="http://schemas.microsoft.com/office/drawing/2014/main" id="{3B7EAF1F-7F84-4A8E-A448-B60200D103AD}"/>
               </a:ext>
             </a:extLst>
           </p:cNvPr>
@@ -12898,13 +12852,6 @@
   <p:clrMapOvr>
     <a:masterClrMapping/>
   </p:clrMapOvr>
-  <p:timing>
-    <p:tnLst>
-      <p:par>
-        <p:cTn id="1" dur="indefinite" restart="never" nodeType="tmRoot"/>
-      </p:par>
-    </p:tnLst>
-  </p:timing>
 </p:sld>
 </file>
 
@@ -12930,7 +12877,7 @@
           <p:cNvPr id="3" name="Imagen 2">
             <a:extLst>
               <a:ext uri="{FF2B5EF4-FFF2-40B4-BE49-F238E27FC236}">
-                <a16:creationId xmlns="" xmlns:a16="http://schemas.microsoft.com/office/drawing/2014/main" id="{1B12D9E4-79DF-4620-871B-8E5EFCFDF971}"/>
+                <a16:creationId xmlns:a16="http://schemas.microsoft.com/office/drawing/2014/main" id="{1B12D9E4-79DF-4620-871B-8E5EFCFDF971}"/>
               </a:ext>
             </a:extLst>
           </p:cNvPr>
@@ -12965,13 +12912,6 @@
   <p:clrMapOvr>
     <a:masterClrMapping/>
   </p:clrMapOvr>
-  <p:timing>
-    <p:tnLst>
-      <p:par>
-        <p:cTn id="1" dur="indefinite" restart="never" nodeType="tmRoot"/>
-      </p:par>
-    </p:tnLst>
-  </p:timing>
 </p:sld>
 </file>
 
@@ -12997,7 +12937,7 @@
           <p:cNvPr id="3" name="Imagen 2">
             <a:extLst>
               <a:ext uri="{FF2B5EF4-FFF2-40B4-BE49-F238E27FC236}">
-                <a16:creationId xmlns="" xmlns:a16="http://schemas.microsoft.com/office/drawing/2014/main" id="{9D704219-3001-4D9B-BE7D-E76775C6E4FC}"/>
+                <a16:creationId xmlns:a16="http://schemas.microsoft.com/office/drawing/2014/main" id="{9D704219-3001-4D9B-BE7D-E76775C6E4FC}"/>
               </a:ext>
             </a:extLst>
           </p:cNvPr>
@@ -13032,13 +12972,6 @@
   <p:clrMapOvr>
     <a:masterClrMapping/>
   </p:clrMapOvr>
-  <p:timing>
-    <p:tnLst>
-      <p:par>
-        <p:cTn id="1" dur="indefinite" restart="never" nodeType="tmRoot"/>
-      </p:par>
-    </p:tnLst>
-  </p:timing>
 </p:sld>
 </file>
 
@@ -13064,7 +12997,7 @@
           <p:cNvPr id="3" name="Imagen 2">
             <a:extLst>
               <a:ext uri="{FF2B5EF4-FFF2-40B4-BE49-F238E27FC236}">
-                <a16:creationId xmlns="" xmlns:a16="http://schemas.microsoft.com/office/drawing/2014/main" id="{C62F0975-D1E1-4F0C-9F64-002B9CB469C3}"/>
+                <a16:creationId xmlns:a16="http://schemas.microsoft.com/office/drawing/2014/main" id="{C62F0975-D1E1-4F0C-9F64-002B9CB469C3}"/>
               </a:ext>
             </a:extLst>
           </p:cNvPr>
@@ -13099,13 +13032,6 @@
   <p:clrMapOvr>
     <a:masterClrMapping/>
   </p:clrMapOvr>
-  <p:timing>
-    <p:tnLst>
-      <p:par>
-        <p:cTn id="1" dur="indefinite" restart="never" nodeType="tmRoot"/>
-      </p:par>
-    </p:tnLst>
-  </p:timing>
 </p:sld>
 </file>
 
@@ -13131,7 +13057,7 @@
           <p:cNvPr id="3" name="Imagen 2">
             <a:extLst>
               <a:ext uri="{FF2B5EF4-FFF2-40B4-BE49-F238E27FC236}">
-                <a16:creationId xmlns="" xmlns:a16="http://schemas.microsoft.com/office/drawing/2014/main" id="{160C3B01-013E-4E73-8129-1C4BFF03ADD4}"/>
+                <a16:creationId xmlns:a16="http://schemas.microsoft.com/office/drawing/2014/main" id="{160C3B01-013E-4E73-8129-1C4BFF03ADD4}"/>
               </a:ext>
             </a:extLst>
           </p:cNvPr>
@@ -13166,13 +13092,6 @@
   <p:clrMapOvr>
     <a:masterClrMapping/>
   </p:clrMapOvr>
-  <p:timing>
-    <p:tnLst>
-      <p:par>
-        <p:cTn id="1" dur="indefinite" restart="never" nodeType="tmRoot"/>
-      </p:par>
-    </p:tnLst>
-  </p:timing>
 </p:sld>
 </file>
 
@@ -13198,7 +13117,7 @@
           <p:cNvPr id="2" name="Título 1">
             <a:extLst>
               <a:ext uri="{FF2B5EF4-FFF2-40B4-BE49-F238E27FC236}">
-                <a16:creationId xmlns="" xmlns:a16="http://schemas.microsoft.com/office/drawing/2014/main" id="{75284E46-0A42-48E3-8035-992BC5F52B19}"/>
+                <a16:creationId xmlns:a16="http://schemas.microsoft.com/office/drawing/2014/main" id="{75284E46-0A42-48E3-8035-992BC5F52B19}"/>
               </a:ext>
             </a:extLst>
           </p:cNvPr>
@@ -13232,7 +13151,7 @@
           <p:cNvPr id="6" name="Imagen 5">
             <a:extLst>
               <a:ext uri="{FF2B5EF4-FFF2-40B4-BE49-F238E27FC236}">
-                <a16:creationId xmlns="" xmlns:a16="http://schemas.microsoft.com/office/drawing/2014/main" id="{4284C0F8-8E26-4F83-A9B5-2B656D43693A}"/>
+                <a16:creationId xmlns:a16="http://schemas.microsoft.com/office/drawing/2014/main" id="{4284C0F8-8E26-4F83-A9B5-2B656D43693A}"/>
               </a:ext>
             </a:extLst>
           </p:cNvPr>
@@ -13262,7 +13181,7 @@
           <p:cNvPr id="8" name="Imagen 7">
             <a:extLst>
               <a:ext uri="{FF2B5EF4-FFF2-40B4-BE49-F238E27FC236}">
-                <a16:creationId xmlns="" xmlns:a16="http://schemas.microsoft.com/office/drawing/2014/main" id="{875B015C-3FF4-4383-BEE4-4E2F7F7B0BB4}"/>
+                <a16:creationId xmlns:a16="http://schemas.microsoft.com/office/drawing/2014/main" id="{875B015C-3FF4-4383-BEE4-4E2F7F7B0BB4}"/>
               </a:ext>
             </a:extLst>
           </p:cNvPr>
@@ -13292,7 +13211,7 @@
           <p:cNvPr id="10" name="Imagen 9">
             <a:extLst>
               <a:ext uri="{FF2B5EF4-FFF2-40B4-BE49-F238E27FC236}">
-                <a16:creationId xmlns="" xmlns:a16="http://schemas.microsoft.com/office/drawing/2014/main" id="{9525026B-00E3-4213-90B0-61D238F84575}"/>
+                <a16:creationId xmlns:a16="http://schemas.microsoft.com/office/drawing/2014/main" id="{9525026B-00E3-4213-90B0-61D238F84575}"/>
               </a:ext>
             </a:extLst>
           </p:cNvPr>
@@ -13322,7 +13241,7 @@
           <p:cNvPr id="11" name="Título 1">
             <a:extLst>
               <a:ext uri="{FF2B5EF4-FFF2-40B4-BE49-F238E27FC236}">
-                <a16:creationId xmlns="" xmlns:a16="http://schemas.microsoft.com/office/drawing/2014/main" id="{87AD5685-ECE1-445E-8D17-1A0D54AF3BF4}"/>
+                <a16:creationId xmlns:a16="http://schemas.microsoft.com/office/drawing/2014/main" id="{87AD5685-ECE1-445E-8D17-1A0D54AF3BF4}"/>
               </a:ext>
             </a:extLst>
           </p:cNvPr>
@@ -13377,7 +13296,7 @@
           <p:cNvPr id="12" name="Título 1">
             <a:extLst>
               <a:ext uri="{FF2B5EF4-FFF2-40B4-BE49-F238E27FC236}">
-                <a16:creationId xmlns="" xmlns:a16="http://schemas.microsoft.com/office/drawing/2014/main" id="{CF7A3351-E942-4C54-8BC3-06222AEBF0B7}"/>
+                <a16:creationId xmlns:a16="http://schemas.microsoft.com/office/drawing/2014/main" id="{CF7A3351-E942-4C54-8BC3-06222AEBF0B7}"/>
               </a:ext>
             </a:extLst>
           </p:cNvPr>
@@ -13432,7 +13351,7 @@
           <p:cNvPr id="13" name="Título 1">
             <a:extLst>
               <a:ext uri="{FF2B5EF4-FFF2-40B4-BE49-F238E27FC236}">
-                <a16:creationId xmlns="" xmlns:a16="http://schemas.microsoft.com/office/drawing/2014/main" id="{8295CD05-6EEB-4B9D-938F-041BC048030C}"/>
+                <a16:creationId xmlns:a16="http://schemas.microsoft.com/office/drawing/2014/main" id="{8295CD05-6EEB-4B9D-938F-041BC048030C}"/>
               </a:ext>
             </a:extLst>
           </p:cNvPr>
@@ -13492,13 +13411,6 @@
   <p:clrMapOvr>
     <a:masterClrMapping/>
   </p:clrMapOvr>
-  <p:timing>
-    <p:tnLst>
-      <p:par>
-        <p:cTn id="1" dur="indefinite" restart="never" nodeType="tmRoot"/>
-      </p:par>
-    </p:tnLst>
-  </p:timing>
 </p:sld>
 </file>
 
@@ -13524,7 +13436,7 @@
           <p:cNvPr id="2" name="Título 1">
             <a:extLst>
               <a:ext uri="{FF2B5EF4-FFF2-40B4-BE49-F238E27FC236}">
-                <a16:creationId xmlns="" xmlns:a16="http://schemas.microsoft.com/office/drawing/2014/main" id="{75284E46-0A42-48E3-8035-992BC5F52B19}"/>
+                <a16:creationId xmlns:a16="http://schemas.microsoft.com/office/drawing/2014/main" id="{75284E46-0A42-48E3-8035-992BC5F52B19}"/>
               </a:ext>
             </a:extLst>
           </p:cNvPr>
@@ -13566,10 +13478,9 @@
           <a:p>
             <a:pPr algn="ctr"/>
             <a:r>
-              <a:rPr lang="es-CL" dirty="0" smtClean="0"/>
+              <a:rPr lang="es-CL" dirty="0"/>
               <a:t>Vía de comunicación con Cliente</a:t>
             </a:r>
-            <a:endParaRPr lang="es-CL" dirty="0"/>
           </a:p>
         </p:txBody>
       </p:sp>
@@ -13607,13 +13518,6 @@
   <p:clrMapOvr>
     <a:masterClrMapping/>
   </p:clrMapOvr>
-  <p:timing>
-    <p:tnLst>
-      <p:par>
-        <p:cTn id="1" dur="indefinite" restart="never" nodeType="tmRoot"/>
-      </p:par>
-    </p:tnLst>
-  </p:timing>
 </p:sld>
 </file>
 
@@ -13651,7 +13555,7 @@
           <a:p>
             <a:pPr algn="ctr"/>
             <a:r>
-              <a:rPr lang="es-CL" dirty="0" smtClean="0"/>
+              <a:rPr lang="es-CL" dirty="0"/>
               <a:t>Base de Datos General</a:t>
             </a:r>
             <a:endParaRPr lang="es-ES" dirty="0"/>
@@ -13692,13 +13596,6 @@
   <p:clrMapOvr>
     <a:masterClrMapping/>
   </p:clrMapOvr>
-  <p:timing>
-    <p:tnLst>
-      <p:par>
-        <p:cTn id="1" dur="indefinite" restart="never" nodeType="tmRoot"/>
-      </p:par>
-    </p:tnLst>
-  </p:timing>
 </p:sld>
 </file>
 
@@ -13721,7 +13618,7 @@
       </p:grpSpPr>
       <p:pic>
         <p:nvPicPr>
-          <p:cNvPr id="4" name="Imagen 3"/>
+          <p:cNvPr id="5" name="Imagen 4"/>
           <p:cNvPicPr>
             <a:picLocks noChangeAspect="1"/>
           </p:cNvPicPr>
@@ -13729,36 +13626,6 @@
         </p:nvPicPr>
         <p:blipFill>
           <a:blip r:embed="rId2">
-            <a:extLst>
-              <a:ext uri="{28A0092B-C50C-407E-A947-70E740481C1C}">
-                <a14:useLocalDpi xmlns:a14="http://schemas.microsoft.com/office/drawing/2010/main" val="0"/>
-              </a:ext>
-            </a:extLst>
-          </a:blip>
-          <a:stretch>
-            <a:fillRect/>
-          </a:stretch>
-        </p:blipFill>
-        <p:spPr>
-          <a:xfrm>
-            <a:off x="914305" y="2193035"/>
-            <a:ext cx="2452711" cy="2452711"/>
-          </a:xfrm>
-          <a:prstGeom prst="rect">
-            <a:avLst/>
-          </a:prstGeom>
-        </p:spPr>
-      </p:pic>
-      <p:pic>
-        <p:nvPicPr>
-          <p:cNvPr id="5" name="Imagen 4"/>
-          <p:cNvPicPr>
-            <a:picLocks noChangeAspect="1"/>
-          </p:cNvPicPr>
-          <p:nvPr/>
-        </p:nvPicPr>
-        <p:blipFill>
-          <a:blip r:embed="rId3">
             <a:extLst>
               <a:ext uri="{28A0092B-C50C-407E-A947-70E740481C1C}">
                 <a14:useLocalDpi xmlns:a14="http://schemas.microsoft.com/office/drawing/2010/main" val="0"/>
@@ -13788,7 +13655,7 @@
           <p:nvPr/>
         </p:nvPicPr>
         <p:blipFill>
-          <a:blip r:embed="rId4">
+          <a:blip r:embed="rId3">
             <a:extLst>
               <a:ext uri="{28A0092B-C50C-407E-A947-70E740481C1C}">
                 <a14:useLocalDpi xmlns:a14="http://schemas.microsoft.com/office/drawing/2010/main" val="0"/>
@@ -13811,55 +13678,10 @@
       </p:pic>
       <p:sp>
         <p:nvSpPr>
-          <p:cNvPr id="7" name="Título 1">
-            <a:extLst>
-              <a:ext uri="{FF2B5EF4-FFF2-40B4-BE49-F238E27FC236}">
-                <a16:creationId xmlns="" xmlns:a16="http://schemas.microsoft.com/office/drawing/2014/main" id="{5BA0D553-22A3-4E10-A582-38C3CDC203AB}"/>
-              </a:ext>
-            </a:extLst>
-          </p:cNvPr>
-          <p:cNvSpPr>
-            <a:spLocks noGrp="1"/>
-          </p:cNvSpPr>
-          <p:nvPr>
-            <p:ph type="title"/>
-          </p:nvPr>
-        </p:nvSpPr>
-        <p:spPr>
-          <a:xfrm>
-            <a:off x="2563838" y="2877670"/>
-            <a:ext cx="5927500" cy="691499"/>
-          </a:xfrm>
-        </p:spPr>
-        <p:txBody>
-          <a:bodyPr>
-            <a:normAutofit/>
-          </a:bodyPr>
-          <a:lstStyle/>
-          <a:p>
-            <a:pPr algn="ctr"/>
-            <a:r>
-              <a:rPr lang="es-CL" sz="2800" b="1" dirty="0" smtClean="0">
-                <a:solidFill>
-                  <a:schemeClr val="bg1"/>
-                </a:solidFill>
-              </a:rPr>
-              <a:t>Reserva</a:t>
-            </a:r>
-            <a:endParaRPr lang="es-CL" sz="4400" b="1" dirty="0">
-              <a:solidFill>
-                <a:schemeClr val="bg1"/>
-              </a:solidFill>
-            </a:endParaRPr>
-          </a:p>
-        </p:txBody>
-      </p:sp>
-      <p:sp>
-        <p:nvSpPr>
           <p:cNvPr id="8" name="Título 1">
             <a:extLst>
               <a:ext uri="{FF2B5EF4-FFF2-40B4-BE49-F238E27FC236}">
-                <a16:creationId xmlns="" xmlns:a16="http://schemas.microsoft.com/office/drawing/2014/main" id="{5BA0D553-22A3-4E10-A582-38C3CDC203AB}"/>
+                <a16:creationId xmlns:a16="http://schemas.microsoft.com/office/drawing/2014/main" id="{5BA0D553-22A3-4E10-A582-38C3CDC203AB}"/>
               </a:ext>
             </a:extLst>
           </p:cNvPr>
@@ -13903,18 +13725,152 @@
           <a:p>
             <a:pPr algn="ctr"/>
             <a:r>
-              <a:rPr lang="es-CL" b="1" dirty="0" smtClean="0">
-                <a:solidFill>
-                  <a:schemeClr val="bg1"/>
-                </a:solidFill>
-              </a:rPr>
+              <a:rPr lang="es-CL" b="1" dirty="0"/>
               <a:t>Productos</a:t>
             </a:r>
-            <a:endParaRPr lang="es-CL" sz="5400" b="1" dirty="0">
-              <a:solidFill>
-                <a:schemeClr val="bg1"/>
-              </a:solidFill>
-            </a:endParaRPr>
+            <a:endParaRPr lang="es-CL" sz="5400" b="1" dirty="0"/>
+          </a:p>
+        </p:txBody>
+      </p:sp>
+      <p:pic>
+        <p:nvPicPr>
+          <p:cNvPr id="3" name="Imagen 2">
+            <a:extLst>
+              <a:ext uri="{FF2B5EF4-FFF2-40B4-BE49-F238E27FC236}">
+                <a16:creationId xmlns:a16="http://schemas.microsoft.com/office/drawing/2014/main" id="{06241BE4-7D64-45F3-8B44-B83B1D0DAAA9}"/>
+              </a:ext>
+            </a:extLst>
+          </p:cNvPr>
+          <p:cNvPicPr>
+            <a:picLocks noChangeAspect="1"/>
+          </p:cNvPicPr>
+          <p:nvPr/>
+        </p:nvPicPr>
+        <p:blipFill>
+          <a:blip r:embed="rId4"/>
+          <a:stretch>
+            <a:fillRect/>
+          </a:stretch>
+        </p:blipFill>
+        <p:spPr>
+          <a:xfrm>
+            <a:off x="1337482" y="2342813"/>
+            <a:ext cx="2452711" cy="2452711"/>
+          </a:xfrm>
+          <a:prstGeom prst="rect">
+            <a:avLst/>
+          </a:prstGeom>
+        </p:spPr>
+      </p:pic>
+      <p:sp>
+        <p:nvSpPr>
+          <p:cNvPr id="10" name="Título 1">
+            <a:extLst>
+              <a:ext uri="{FF2B5EF4-FFF2-40B4-BE49-F238E27FC236}">
+                <a16:creationId xmlns:a16="http://schemas.microsoft.com/office/drawing/2014/main" id="{0A0CC1C0-B587-4F08-B29A-976F17662B57}"/>
+              </a:ext>
+            </a:extLst>
+          </p:cNvPr>
+          <p:cNvSpPr txBox="1">
+            <a:spLocks/>
+          </p:cNvSpPr>
+          <p:nvPr/>
+        </p:nvSpPr>
+        <p:spPr>
+          <a:xfrm>
+            <a:off x="1081962" y="4977821"/>
+            <a:ext cx="2963750" cy="691499"/>
+          </a:xfrm>
+          <a:prstGeom prst="rect">
+            <a:avLst/>
+          </a:prstGeom>
+        </p:spPr>
+        <p:txBody>
+          <a:bodyPr vert="horz" lIns="91440" tIns="45720" rIns="91440" bIns="45720" rtlCol="0" anchor="ctr">
+            <a:normAutofit/>
+          </a:bodyPr>
+          <a:lstStyle>
+            <a:lvl1pPr algn="l" defTabSz="914400" rtl="0" eaLnBrk="1" latinLnBrk="0" hangingPunct="1">
+              <a:lnSpc>
+                <a:spcPct val="90000"/>
+              </a:lnSpc>
+              <a:spcBef>
+                <a:spcPct val="0"/>
+              </a:spcBef>
+              <a:buNone/>
+              <a:defRPr sz="3600" kern="1200" cap="all" baseline="0">
+                <a:solidFill>
+                  <a:schemeClr val="tx1"/>
+                </a:solidFill>
+                <a:latin typeface="+mj-lt"/>
+                <a:ea typeface="+mj-ea"/>
+                <a:cs typeface="+mj-cs"/>
+              </a:defRPr>
+            </a:lvl1pPr>
+          </a:lstStyle>
+          <a:p>
+            <a:pPr algn="ctr"/>
+            <a:r>
+              <a:rPr lang="es-CL" b="1" dirty="0"/>
+              <a:t>EMPRESA</a:t>
+            </a:r>
+            <a:endParaRPr lang="es-CL" sz="5400" b="1" dirty="0"/>
+          </a:p>
+        </p:txBody>
+      </p:sp>
+      <p:sp>
+        <p:nvSpPr>
+          <p:cNvPr id="11" name="Título 1">
+            <a:extLst>
+              <a:ext uri="{FF2B5EF4-FFF2-40B4-BE49-F238E27FC236}">
+                <a16:creationId xmlns:a16="http://schemas.microsoft.com/office/drawing/2014/main" id="{BA965741-BFE7-458D-AA0F-645C7E6FC942}"/>
+              </a:ext>
+            </a:extLst>
+          </p:cNvPr>
+          <p:cNvSpPr txBox="1">
+            <a:spLocks/>
+          </p:cNvSpPr>
+          <p:nvPr/>
+        </p:nvSpPr>
+        <p:spPr>
+          <a:xfrm>
+            <a:off x="4127265" y="3223418"/>
+            <a:ext cx="2963750" cy="691499"/>
+          </a:xfrm>
+          <a:prstGeom prst="rect">
+            <a:avLst/>
+          </a:prstGeom>
+        </p:spPr>
+        <p:txBody>
+          <a:bodyPr vert="horz" lIns="91440" tIns="45720" rIns="91440" bIns="45720" rtlCol="0" anchor="ctr">
+            <a:normAutofit/>
+          </a:bodyPr>
+          <a:lstStyle>
+            <a:lvl1pPr algn="l" defTabSz="914400" rtl="0" eaLnBrk="1" latinLnBrk="0" hangingPunct="1">
+              <a:lnSpc>
+                <a:spcPct val="90000"/>
+              </a:lnSpc>
+              <a:spcBef>
+                <a:spcPct val="0"/>
+              </a:spcBef>
+              <a:buNone/>
+              <a:defRPr sz="3600" kern="1200" cap="all" baseline="0">
+                <a:solidFill>
+                  <a:schemeClr val="tx1"/>
+                </a:solidFill>
+                <a:latin typeface="+mj-lt"/>
+                <a:ea typeface="+mj-ea"/>
+                <a:cs typeface="+mj-cs"/>
+              </a:defRPr>
+            </a:lvl1pPr>
+          </a:lstStyle>
+          <a:p>
+            <a:pPr algn="ctr"/>
+            <a:r>
+              <a:rPr lang="es-CL" b="1" dirty="0"/>
+              <a:t>RESERVA</a:t>
+            </a:r>
+            <a:endParaRPr lang="es-CL" sz="5400" b="1" dirty="0"/>
           </a:p>
         </p:txBody>
       </p:sp>
@@ -13928,13 +13884,6 @@
   <p:clrMapOvr>
     <a:masterClrMapping/>
   </p:clrMapOvr>
-  <p:timing>
-    <p:tnLst>
-      <p:par>
-        <p:cTn id="1" dur="indefinite" restart="never" nodeType="tmRoot"/>
-      </p:par>
-    </p:tnLst>
-  </p:timing>
 </p:sld>
 </file>
 
@@ -13960,7 +13909,7 @@
           <p:cNvPr id="2" name="Título 1">
             <a:extLst>
               <a:ext uri="{FF2B5EF4-FFF2-40B4-BE49-F238E27FC236}">
-                <a16:creationId xmlns="" xmlns:a16="http://schemas.microsoft.com/office/drawing/2014/main" id="{5BA0D553-22A3-4E10-A582-38C3CDC203AB}"/>
+                <a16:creationId xmlns:a16="http://schemas.microsoft.com/office/drawing/2014/main" id="{5BA0D553-22A3-4E10-A582-38C3CDC203AB}"/>
               </a:ext>
             </a:extLst>
           </p:cNvPr>
@@ -14001,13 +13950,6 @@
   <p:clrMapOvr>
     <a:masterClrMapping/>
   </p:clrMapOvr>
-  <p:timing>
-    <p:tnLst>
-      <p:par>
-        <p:cTn id="1" dur="indefinite" restart="never" nodeType="tmRoot"/>
-      </p:par>
-    </p:tnLst>
-  </p:timing>
 </p:sld>
 </file>
 
@@ -14033,7 +13975,187 @@
           <p:cNvPr id="3" name="Imagen 2">
             <a:extLst>
               <a:ext uri="{FF2B5EF4-FFF2-40B4-BE49-F238E27FC236}">
-                <a16:creationId xmlns="" xmlns:a16="http://schemas.microsoft.com/office/drawing/2014/main" id="{B33B9D7C-EA46-4B2C-9065-0986F011B726}"/>
+                <a16:creationId xmlns:a16="http://schemas.microsoft.com/office/drawing/2014/main" id="{CEFD6630-EABB-4A4D-A230-0307100D0CF3}"/>
+              </a:ext>
+            </a:extLst>
+          </p:cNvPr>
+          <p:cNvPicPr>
+            <a:picLocks noChangeAspect="1"/>
+          </p:cNvPicPr>
+          <p:nvPr/>
+        </p:nvPicPr>
+        <p:blipFill>
+          <a:blip r:embed="rId2"/>
+          <a:stretch>
+            <a:fillRect/>
+          </a:stretch>
+        </p:blipFill>
+        <p:spPr>
+          <a:xfrm>
+            <a:off x="1254787" y="0"/>
+            <a:ext cx="9682426" cy="6858000"/>
+          </a:xfrm>
+          <a:prstGeom prst="rect">
+            <a:avLst/>
+          </a:prstGeom>
+        </p:spPr>
+      </p:pic>
+    </p:spTree>
+    <p:extLst>
+      <p:ext uri="{BB962C8B-B14F-4D97-AF65-F5344CB8AC3E}">
+        <p14:creationId xmlns:p14="http://schemas.microsoft.com/office/powerpoint/2010/main" val="3046902958"/>
+      </p:ext>
+    </p:extLst>
+  </p:cSld>
+  <p:clrMapOvr>
+    <a:masterClrMapping/>
+  </p:clrMapOvr>
+</p:sld>
+</file>
+
+<file path=ppt/slides/slide7.xml><?xml version="1.0" encoding="utf-8"?>
+<p:sld xmlns:a="http://schemas.openxmlformats.org/drawingml/2006/main" xmlns:r="http://schemas.openxmlformats.org/officeDocument/2006/relationships" xmlns:p="http://schemas.openxmlformats.org/presentationml/2006/main">
+  <p:cSld>
+    <p:spTree>
+      <p:nvGrpSpPr>
+        <p:cNvPr id="1" name=""/>
+        <p:cNvGrpSpPr/>
+        <p:nvPr/>
+      </p:nvGrpSpPr>
+      <p:grpSpPr>
+        <a:xfrm>
+          <a:off x="0" y="0"/>
+          <a:ext cx="0" cy="0"/>
+          <a:chOff x="0" y="0"/>
+          <a:chExt cx="0" cy="0"/>
+        </a:xfrm>
+      </p:grpSpPr>
+      <p:pic>
+        <p:nvPicPr>
+          <p:cNvPr id="4" name="Imagen 3">
+            <a:extLst>
+              <a:ext uri="{FF2B5EF4-FFF2-40B4-BE49-F238E27FC236}">
+                <a16:creationId xmlns:a16="http://schemas.microsoft.com/office/drawing/2014/main" id="{D4A70B32-DCDE-4BE7-AC2D-6C26291729E9}"/>
+              </a:ext>
+            </a:extLst>
+          </p:cNvPr>
+          <p:cNvPicPr>
+            <a:picLocks noChangeAspect="1"/>
+          </p:cNvPicPr>
+          <p:nvPr/>
+        </p:nvPicPr>
+        <p:blipFill>
+          <a:blip r:embed="rId2"/>
+          <a:stretch>
+            <a:fillRect/>
+          </a:stretch>
+        </p:blipFill>
+        <p:spPr>
+          <a:xfrm>
+            <a:off x="1246347" y="7743"/>
+            <a:ext cx="9688353" cy="6850257"/>
+          </a:xfrm>
+          <a:prstGeom prst="rect">
+            <a:avLst/>
+          </a:prstGeom>
+        </p:spPr>
+      </p:pic>
+    </p:spTree>
+    <p:extLst>
+      <p:ext uri="{BB962C8B-B14F-4D97-AF65-F5344CB8AC3E}">
+        <p14:creationId xmlns:p14="http://schemas.microsoft.com/office/powerpoint/2010/main" val="2113794953"/>
+      </p:ext>
+    </p:extLst>
+  </p:cSld>
+  <p:clrMapOvr>
+    <a:masterClrMapping/>
+  </p:clrMapOvr>
+</p:sld>
+</file>
+
+<file path=ppt/slides/slide8.xml><?xml version="1.0" encoding="utf-8"?>
+<p:sld xmlns:a="http://schemas.openxmlformats.org/drawingml/2006/main" xmlns:r="http://schemas.openxmlformats.org/officeDocument/2006/relationships" xmlns:p="http://schemas.openxmlformats.org/presentationml/2006/main">
+  <p:cSld>
+    <p:spTree>
+      <p:nvGrpSpPr>
+        <p:cNvPr id="1" name=""/>
+        <p:cNvGrpSpPr/>
+        <p:nvPr/>
+      </p:nvGrpSpPr>
+      <p:grpSpPr>
+        <a:xfrm>
+          <a:off x="0" y="0"/>
+          <a:ext cx="0" cy="0"/>
+          <a:chOff x="0" y="0"/>
+          <a:chExt cx="0" cy="0"/>
+        </a:xfrm>
+      </p:grpSpPr>
+      <p:pic>
+        <p:nvPicPr>
+          <p:cNvPr id="3" name="Imagen 2">
+            <a:extLst>
+              <a:ext uri="{FF2B5EF4-FFF2-40B4-BE49-F238E27FC236}">
+                <a16:creationId xmlns:a16="http://schemas.microsoft.com/office/drawing/2014/main" id="{9D229041-ED79-4C08-9F5B-F09FA9021137}"/>
+              </a:ext>
+            </a:extLst>
+          </p:cNvPr>
+          <p:cNvPicPr>
+            <a:picLocks noChangeAspect="1"/>
+          </p:cNvPicPr>
+          <p:nvPr/>
+        </p:nvPicPr>
+        <p:blipFill>
+          <a:blip r:embed="rId2"/>
+          <a:stretch>
+            <a:fillRect/>
+          </a:stretch>
+        </p:blipFill>
+        <p:spPr>
+          <a:xfrm>
+            <a:off x="1250976" y="0"/>
+            <a:ext cx="9690048" cy="6858000"/>
+          </a:xfrm>
+          <a:prstGeom prst="rect">
+            <a:avLst/>
+          </a:prstGeom>
+        </p:spPr>
+      </p:pic>
+    </p:spTree>
+    <p:extLst>
+      <p:ext uri="{BB962C8B-B14F-4D97-AF65-F5344CB8AC3E}">
+        <p14:creationId xmlns:p14="http://schemas.microsoft.com/office/powerpoint/2010/main" val="2603012298"/>
+      </p:ext>
+    </p:extLst>
+  </p:cSld>
+  <p:clrMapOvr>
+    <a:masterClrMapping/>
+  </p:clrMapOvr>
+</p:sld>
+</file>
+
+<file path=ppt/slides/slide9.xml><?xml version="1.0" encoding="utf-8"?>
+<p:sld xmlns:a="http://schemas.openxmlformats.org/drawingml/2006/main" xmlns:r="http://schemas.openxmlformats.org/officeDocument/2006/relationships" xmlns:p="http://schemas.openxmlformats.org/presentationml/2006/main">
+  <p:cSld>
+    <p:spTree>
+      <p:nvGrpSpPr>
+        <p:cNvPr id="1" name=""/>
+        <p:cNvGrpSpPr/>
+        <p:nvPr/>
+      </p:nvGrpSpPr>
+      <p:grpSpPr>
+        <a:xfrm>
+          <a:off x="0" y="0"/>
+          <a:ext cx="0" cy="0"/>
+          <a:chOff x="0" y="0"/>
+          <a:chExt cx="0" cy="0"/>
+        </a:xfrm>
+      </p:grpSpPr>
+      <p:pic>
+        <p:nvPicPr>
+          <p:cNvPr id="3" name="Imagen 2">
+            <a:extLst>
+              <a:ext uri="{FF2B5EF4-FFF2-40B4-BE49-F238E27FC236}">
+                <a16:creationId xmlns:a16="http://schemas.microsoft.com/office/drawing/2014/main" id="{B33B9D7C-EA46-4B2C-9065-0986F011B726}"/>
               </a:ext>
             </a:extLst>
           </p:cNvPr>
@@ -14068,214 +14190,6 @@
   <p:clrMapOvr>
     <a:masterClrMapping/>
   </p:clrMapOvr>
-  <p:timing>
-    <p:tnLst>
-      <p:par>
-        <p:cTn id="1" dur="indefinite" restart="never" nodeType="tmRoot"/>
-      </p:par>
-    </p:tnLst>
-  </p:timing>
-</p:sld>
-</file>
-
-<file path=ppt/slides/slide7.xml><?xml version="1.0" encoding="utf-8"?>
-<p:sld xmlns:a="http://schemas.openxmlformats.org/drawingml/2006/main" xmlns:r="http://schemas.openxmlformats.org/officeDocument/2006/relationships" xmlns:p="http://schemas.openxmlformats.org/presentationml/2006/main">
-  <p:cSld>
-    <p:spTree>
-      <p:nvGrpSpPr>
-        <p:cNvPr id="1" name=""/>
-        <p:cNvGrpSpPr/>
-        <p:nvPr/>
-      </p:nvGrpSpPr>
-      <p:grpSpPr>
-        <a:xfrm>
-          <a:off x="0" y="0"/>
-          <a:ext cx="0" cy="0"/>
-          <a:chOff x="0" y="0"/>
-          <a:chExt cx="0" cy="0"/>
-        </a:xfrm>
-      </p:grpSpPr>
-      <p:pic>
-        <p:nvPicPr>
-          <p:cNvPr id="3" name="Imagen 2">
-            <a:extLst>
-              <a:ext uri="{FF2B5EF4-FFF2-40B4-BE49-F238E27FC236}">
-                <a16:creationId xmlns="" xmlns:a16="http://schemas.microsoft.com/office/drawing/2014/main" id="{9D229041-ED79-4C08-9F5B-F09FA9021137}"/>
-              </a:ext>
-            </a:extLst>
-          </p:cNvPr>
-          <p:cNvPicPr>
-            <a:picLocks noChangeAspect="1"/>
-          </p:cNvPicPr>
-          <p:nvPr/>
-        </p:nvPicPr>
-        <p:blipFill>
-          <a:blip r:embed="rId2"/>
-          <a:stretch>
-            <a:fillRect/>
-          </a:stretch>
-        </p:blipFill>
-        <p:spPr>
-          <a:xfrm>
-            <a:off x="1250976" y="0"/>
-            <a:ext cx="9690048" cy="6858000"/>
-          </a:xfrm>
-          <a:prstGeom prst="rect">
-            <a:avLst/>
-          </a:prstGeom>
-        </p:spPr>
-      </p:pic>
-    </p:spTree>
-    <p:extLst>
-      <p:ext uri="{BB962C8B-B14F-4D97-AF65-F5344CB8AC3E}">
-        <p14:creationId xmlns:p14="http://schemas.microsoft.com/office/powerpoint/2010/main" val="2603012298"/>
-      </p:ext>
-    </p:extLst>
-  </p:cSld>
-  <p:clrMapOvr>
-    <a:masterClrMapping/>
-  </p:clrMapOvr>
-  <p:timing>
-    <p:tnLst>
-      <p:par>
-        <p:cTn id="1" dur="indefinite" restart="never" nodeType="tmRoot"/>
-      </p:par>
-    </p:tnLst>
-  </p:timing>
-</p:sld>
-</file>
-
-<file path=ppt/slides/slide8.xml><?xml version="1.0" encoding="utf-8"?>
-<p:sld xmlns:a="http://schemas.openxmlformats.org/drawingml/2006/main" xmlns:r="http://schemas.openxmlformats.org/officeDocument/2006/relationships" xmlns:p="http://schemas.openxmlformats.org/presentationml/2006/main">
-  <p:cSld>
-    <p:spTree>
-      <p:nvGrpSpPr>
-        <p:cNvPr id="1" name=""/>
-        <p:cNvGrpSpPr/>
-        <p:nvPr/>
-      </p:nvGrpSpPr>
-      <p:grpSpPr>
-        <a:xfrm>
-          <a:off x="0" y="0"/>
-          <a:ext cx="0" cy="0"/>
-          <a:chOff x="0" y="0"/>
-          <a:chExt cx="0" cy="0"/>
-        </a:xfrm>
-      </p:grpSpPr>
-      <p:pic>
-        <p:nvPicPr>
-          <p:cNvPr id="3" name="Imagen 2">
-            <a:extLst>
-              <a:ext uri="{FF2B5EF4-FFF2-40B4-BE49-F238E27FC236}">
-                <a16:creationId xmlns="" xmlns:a16="http://schemas.microsoft.com/office/drawing/2014/main" id="{38FB5474-7FCC-44E9-9096-1299E61F5E92}"/>
-              </a:ext>
-            </a:extLst>
-          </p:cNvPr>
-          <p:cNvPicPr>
-            <a:picLocks noChangeAspect="1"/>
-          </p:cNvPicPr>
-          <p:nvPr/>
-        </p:nvPicPr>
-        <p:blipFill>
-          <a:blip r:embed="rId2"/>
-          <a:stretch>
-            <a:fillRect/>
-          </a:stretch>
-        </p:blipFill>
-        <p:spPr>
-          <a:xfrm>
-            <a:off x="1245557" y="0"/>
-            <a:ext cx="9700886" cy="6858000"/>
-          </a:xfrm>
-          <a:prstGeom prst="rect">
-            <a:avLst/>
-          </a:prstGeom>
-        </p:spPr>
-      </p:pic>
-    </p:spTree>
-    <p:extLst>
-      <p:ext uri="{BB962C8B-B14F-4D97-AF65-F5344CB8AC3E}">
-        <p14:creationId xmlns:p14="http://schemas.microsoft.com/office/powerpoint/2010/main" val="925268731"/>
-      </p:ext>
-    </p:extLst>
-  </p:cSld>
-  <p:clrMapOvr>
-    <a:masterClrMapping/>
-  </p:clrMapOvr>
-  <p:timing>
-    <p:tnLst>
-      <p:par>
-        <p:cTn id="1" dur="indefinite" restart="never" nodeType="tmRoot"/>
-      </p:par>
-    </p:tnLst>
-  </p:timing>
-</p:sld>
-</file>
-
-<file path=ppt/slides/slide9.xml><?xml version="1.0" encoding="utf-8"?>
-<p:sld xmlns:a="http://schemas.openxmlformats.org/drawingml/2006/main" xmlns:r="http://schemas.openxmlformats.org/officeDocument/2006/relationships" xmlns:p="http://schemas.openxmlformats.org/presentationml/2006/main">
-  <p:cSld>
-    <p:spTree>
-      <p:nvGrpSpPr>
-        <p:cNvPr id="1" name=""/>
-        <p:cNvGrpSpPr/>
-        <p:nvPr/>
-      </p:nvGrpSpPr>
-      <p:grpSpPr>
-        <a:xfrm>
-          <a:off x="0" y="0"/>
-          <a:ext cx="0" cy="0"/>
-          <a:chOff x="0" y="0"/>
-          <a:chExt cx="0" cy="0"/>
-        </a:xfrm>
-      </p:grpSpPr>
-      <p:pic>
-        <p:nvPicPr>
-          <p:cNvPr id="3" name="Imagen 2">
-            <a:extLst>
-              <a:ext uri="{FF2B5EF4-FFF2-40B4-BE49-F238E27FC236}">
-                <a16:creationId xmlns="" xmlns:a16="http://schemas.microsoft.com/office/drawing/2014/main" id="{CEFD6630-EABB-4A4D-A230-0307100D0CF3}"/>
-              </a:ext>
-            </a:extLst>
-          </p:cNvPr>
-          <p:cNvPicPr>
-            <a:picLocks noChangeAspect="1"/>
-          </p:cNvPicPr>
-          <p:nvPr/>
-        </p:nvPicPr>
-        <p:blipFill>
-          <a:blip r:embed="rId2"/>
-          <a:stretch>
-            <a:fillRect/>
-          </a:stretch>
-        </p:blipFill>
-        <p:spPr>
-          <a:xfrm>
-            <a:off x="1254787" y="0"/>
-            <a:ext cx="9682426" cy="6858000"/>
-          </a:xfrm>
-          <a:prstGeom prst="rect">
-            <a:avLst/>
-          </a:prstGeom>
-        </p:spPr>
-      </p:pic>
-    </p:spTree>
-    <p:extLst>
-      <p:ext uri="{BB962C8B-B14F-4D97-AF65-F5344CB8AC3E}">
-        <p14:creationId xmlns:p14="http://schemas.microsoft.com/office/powerpoint/2010/main" val="3046902958"/>
-      </p:ext>
-    </p:extLst>
-  </p:cSld>
-  <p:clrMapOvr>
-    <a:masterClrMapping/>
-  </p:clrMapOvr>
-  <p:timing>
-    <p:tnLst>
-      <p:par>
-        <p:cTn id="1" dur="indefinite" restart="never" nodeType="tmRoot"/>
-      </p:par>
-    </p:tnLst>
-  </p:timing>
 </p:sld>
 </file>
 

</xml_diff>